<commit_message>
updated the powerpoint, started fleshing out the sections
</commit_message>
<xml_diff>
--- a/PVPMC-23-Validation-Hub.pptx
+++ b/PVPMC-23-Validation-Hub.pptx
@@ -221,6 +221,2706 @@
 </p:presentation>
 </file>
 
+<file path=ppt/authors.xml><?xml version="1.0" encoding="utf-8"?>
+<p188:authorLst xmlns:a="http://schemas.openxmlformats.org/drawingml/2006/main" xmlns:r="http://schemas.openxmlformats.org/officeDocument/2006/relationships" xmlns:p188="http://schemas.microsoft.com/office/powerpoint/2018/8/main">
+  <p188:author id="{051714D3-165F-07BF-A991-5AD1DD174261}" name="Perry, Kirsten" initials="PK" userId="S::kperry@nrel.gov::89c44cb3-b2d3-460a-b0e9-c302859e17c2" providerId="AD"/>
+</p188:authorLst>
+</file>
+
+<file path=ppt/comments/modernComment_100_0.xml><?xml version="1.0" encoding="utf-8"?>
+<p188:cmLst xmlns:a="http://schemas.openxmlformats.org/drawingml/2006/main" xmlns:r="http://schemas.openxmlformats.org/officeDocument/2006/relationships" xmlns:p188="http://schemas.microsoft.com/office/powerpoint/2018/8/main">
+  <p188:cm id="{59963FEF-5496-4965-B03F-C51422CD7C67}" authorId="{051714D3-165F-07BF-A991-5AD1DD174261}" created="2023-04-27T19:33:23.242">
+    <ac:deMkLst xmlns:ac="http://schemas.microsoft.com/office/drawing/2013/main/command">
+      <pc:docMk xmlns:pc="http://schemas.microsoft.com/office/powerpoint/2013/main/command"/>
+      <pc:sldMk xmlns:pc="http://schemas.microsoft.com/office/powerpoint/2013/main/command" cId="0" sldId="256"/>
+      <ac:spMk id="20" creationId="{476F07F2-511F-8E6D-1FE8-9C43E58E492A}"/>
+    </ac:deMkLst>
+    <p188:txBody>
+      <a:bodyPr/>
+      <a:lstStyle/>
+      <a:p>
+        <a:r>
+          <a:rPr lang="en-US"/>
+          <a:t>How do the users access the algorithm code submissions?</a:t>
+        </a:r>
+      </a:p>
+    </p188:txBody>
+  </p188:cm>
+</p188:cmLst>
+</file>
+
+<file path=ppt/diagrams/colors1.xml><?xml version="1.0" encoding="utf-8"?>
+<dgm:colorsDef xmlns:dgm="http://schemas.openxmlformats.org/drawingml/2006/diagram" xmlns:a="http://schemas.openxmlformats.org/drawingml/2006/main" uniqueId="urn:microsoft.com/office/officeart/2005/8/colors/accent6_2">
+  <dgm:title val=""/>
+  <dgm:desc val=""/>
+  <dgm:catLst>
+    <dgm:cat type="accent6" pri="11200"/>
+  </dgm:catLst>
+  <dgm:styleLbl name="node0">
+    <dgm:fillClrLst meth="repeat">
+      <a:schemeClr val="accent6"/>
+    </dgm:fillClrLst>
+    <dgm:linClrLst meth="repeat">
+      <a:schemeClr val="lt1"/>
+    </dgm:linClrLst>
+    <dgm:effectClrLst/>
+    <dgm:txLinClrLst/>
+    <dgm:txFillClrLst/>
+    <dgm:txEffectClrLst/>
+  </dgm:styleLbl>
+  <dgm:styleLbl name="node1">
+    <dgm:fillClrLst meth="repeat">
+      <a:schemeClr val="accent6"/>
+    </dgm:fillClrLst>
+    <dgm:linClrLst meth="repeat">
+      <a:schemeClr val="lt1"/>
+    </dgm:linClrLst>
+    <dgm:effectClrLst/>
+    <dgm:txLinClrLst/>
+    <dgm:txFillClrLst/>
+    <dgm:txEffectClrLst/>
+  </dgm:styleLbl>
+  <dgm:styleLbl name="alignNode1">
+    <dgm:fillClrLst meth="repeat">
+      <a:schemeClr val="accent6"/>
+    </dgm:fillClrLst>
+    <dgm:linClrLst meth="repeat">
+      <a:schemeClr val="accent6"/>
+    </dgm:linClrLst>
+    <dgm:effectClrLst/>
+    <dgm:txLinClrLst/>
+    <dgm:txFillClrLst/>
+    <dgm:txEffectClrLst/>
+  </dgm:styleLbl>
+  <dgm:styleLbl name="lnNode1">
+    <dgm:fillClrLst meth="repeat">
+      <a:schemeClr val="accent6"/>
+    </dgm:fillClrLst>
+    <dgm:linClrLst meth="repeat">
+      <a:schemeClr val="lt1"/>
+    </dgm:linClrLst>
+    <dgm:effectClrLst/>
+    <dgm:txLinClrLst/>
+    <dgm:txFillClrLst/>
+    <dgm:txEffectClrLst/>
+  </dgm:styleLbl>
+  <dgm:styleLbl name="vennNode1">
+    <dgm:fillClrLst meth="repeat">
+      <a:schemeClr val="accent6">
+        <a:alpha val="50000"/>
+      </a:schemeClr>
+    </dgm:fillClrLst>
+    <dgm:linClrLst meth="repeat">
+      <a:schemeClr val="lt1"/>
+    </dgm:linClrLst>
+    <dgm:effectClrLst/>
+    <dgm:txLinClrLst/>
+    <dgm:txFillClrLst/>
+    <dgm:txEffectClrLst/>
+  </dgm:styleLbl>
+  <dgm:styleLbl name="node2">
+    <dgm:fillClrLst meth="repeat">
+      <a:schemeClr val="accent6"/>
+    </dgm:fillClrLst>
+    <dgm:linClrLst meth="repeat">
+      <a:schemeClr val="lt1"/>
+    </dgm:linClrLst>
+    <dgm:effectClrLst/>
+    <dgm:txLinClrLst/>
+    <dgm:txFillClrLst/>
+    <dgm:txEffectClrLst/>
+  </dgm:styleLbl>
+  <dgm:styleLbl name="node3">
+    <dgm:fillClrLst meth="repeat">
+      <a:schemeClr val="accent6"/>
+    </dgm:fillClrLst>
+    <dgm:linClrLst meth="repeat">
+      <a:schemeClr val="lt1"/>
+    </dgm:linClrLst>
+    <dgm:effectClrLst/>
+    <dgm:txLinClrLst/>
+    <dgm:txFillClrLst/>
+    <dgm:txEffectClrLst/>
+  </dgm:styleLbl>
+  <dgm:styleLbl name="node4">
+    <dgm:fillClrLst meth="repeat">
+      <a:schemeClr val="accent6"/>
+    </dgm:fillClrLst>
+    <dgm:linClrLst meth="repeat">
+      <a:schemeClr val="lt1"/>
+    </dgm:linClrLst>
+    <dgm:effectClrLst/>
+    <dgm:txLinClrLst/>
+    <dgm:txFillClrLst/>
+    <dgm:txEffectClrLst/>
+  </dgm:styleLbl>
+  <dgm:styleLbl name="fgImgPlace1">
+    <dgm:fillClrLst meth="repeat">
+      <a:schemeClr val="accent6">
+        <a:tint val="50000"/>
+      </a:schemeClr>
+    </dgm:fillClrLst>
+    <dgm:linClrLst meth="repeat">
+      <a:schemeClr val="lt1"/>
+    </dgm:linClrLst>
+    <dgm:effectClrLst/>
+    <dgm:txLinClrLst/>
+    <dgm:txFillClrLst meth="repeat">
+      <a:schemeClr val="lt1"/>
+    </dgm:txFillClrLst>
+    <dgm:txEffectClrLst/>
+  </dgm:styleLbl>
+  <dgm:styleLbl name="alignImgPlace1">
+    <dgm:fillClrLst meth="repeat">
+      <a:schemeClr val="accent6">
+        <a:tint val="50000"/>
+      </a:schemeClr>
+    </dgm:fillClrLst>
+    <dgm:linClrLst meth="repeat">
+      <a:schemeClr val="lt1"/>
+    </dgm:linClrLst>
+    <dgm:effectClrLst/>
+    <dgm:txLinClrLst/>
+    <dgm:txFillClrLst meth="repeat">
+      <a:schemeClr val="lt1"/>
+    </dgm:txFillClrLst>
+    <dgm:txEffectClrLst/>
+  </dgm:styleLbl>
+  <dgm:styleLbl name="bgImgPlace1">
+    <dgm:fillClrLst meth="repeat">
+      <a:schemeClr val="accent6">
+        <a:tint val="50000"/>
+      </a:schemeClr>
+    </dgm:fillClrLst>
+    <dgm:linClrLst meth="repeat">
+      <a:schemeClr val="lt1"/>
+    </dgm:linClrLst>
+    <dgm:effectClrLst/>
+    <dgm:txLinClrLst/>
+    <dgm:txFillClrLst meth="repeat">
+      <a:schemeClr val="lt1"/>
+    </dgm:txFillClrLst>
+    <dgm:txEffectClrLst/>
+  </dgm:styleLbl>
+  <dgm:styleLbl name="sibTrans2D1">
+    <dgm:fillClrLst meth="repeat">
+      <a:schemeClr val="accent6">
+        <a:tint val="60000"/>
+      </a:schemeClr>
+    </dgm:fillClrLst>
+    <dgm:linClrLst meth="repeat">
+      <a:schemeClr val="accent6">
+        <a:tint val="60000"/>
+      </a:schemeClr>
+    </dgm:linClrLst>
+    <dgm:effectClrLst/>
+    <dgm:txLinClrLst/>
+    <dgm:txFillClrLst/>
+    <dgm:txEffectClrLst/>
+  </dgm:styleLbl>
+  <dgm:styleLbl name="fgSibTrans2D1">
+    <dgm:fillClrLst meth="repeat">
+      <a:schemeClr val="accent6">
+        <a:tint val="60000"/>
+      </a:schemeClr>
+    </dgm:fillClrLst>
+    <dgm:linClrLst meth="repeat">
+      <a:schemeClr val="accent6">
+        <a:tint val="60000"/>
+      </a:schemeClr>
+    </dgm:linClrLst>
+    <dgm:effectClrLst/>
+    <dgm:txLinClrLst/>
+    <dgm:txFillClrLst/>
+    <dgm:txEffectClrLst/>
+  </dgm:styleLbl>
+  <dgm:styleLbl name="bgSibTrans2D1">
+    <dgm:fillClrLst meth="repeat">
+      <a:schemeClr val="accent6">
+        <a:tint val="60000"/>
+      </a:schemeClr>
+    </dgm:fillClrLst>
+    <dgm:linClrLst meth="repeat">
+      <a:schemeClr val="accent6">
+        <a:tint val="60000"/>
+      </a:schemeClr>
+    </dgm:linClrLst>
+    <dgm:effectClrLst/>
+    <dgm:txLinClrLst/>
+    <dgm:txFillClrLst/>
+    <dgm:txEffectClrLst/>
+  </dgm:styleLbl>
+  <dgm:styleLbl name="sibTrans1D1">
+    <dgm:fillClrLst meth="repeat">
+      <a:schemeClr val="accent6"/>
+    </dgm:fillClrLst>
+    <dgm:linClrLst meth="repeat">
+      <a:schemeClr val="accent6"/>
+    </dgm:linClrLst>
+    <dgm:effectClrLst/>
+    <dgm:txLinClrLst/>
+    <dgm:txFillClrLst meth="repeat">
+      <a:schemeClr val="tx1"/>
+    </dgm:txFillClrLst>
+    <dgm:txEffectClrLst/>
+  </dgm:styleLbl>
+  <dgm:styleLbl name="callout">
+    <dgm:fillClrLst meth="repeat">
+      <a:schemeClr val="accent6"/>
+    </dgm:fillClrLst>
+    <dgm:linClrLst meth="repeat">
+      <a:schemeClr val="accent6">
+        <a:tint val="50000"/>
+      </a:schemeClr>
+    </dgm:linClrLst>
+    <dgm:effectClrLst/>
+    <dgm:txLinClrLst/>
+    <dgm:txFillClrLst meth="repeat">
+      <a:schemeClr val="tx1"/>
+    </dgm:txFillClrLst>
+    <dgm:txEffectClrLst/>
+  </dgm:styleLbl>
+  <dgm:styleLbl name="asst0">
+    <dgm:fillClrLst meth="repeat">
+      <a:schemeClr val="accent6"/>
+    </dgm:fillClrLst>
+    <dgm:linClrLst meth="repeat">
+      <a:schemeClr val="lt1"/>
+    </dgm:linClrLst>
+    <dgm:effectClrLst/>
+    <dgm:txLinClrLst/>
+    <dgm:txFillClrLst/>
+    <dgm:txEffectClrLst/>
+  </dgm:styleLbl>
+  <dgm:styleLbl name="asst1">
+    <dgm:fillClrLst meth="repeat">
+      <a:schemeClr val="accent6"/>
+    </dgm:fillClrLst>
+    <dgm:linClrLst meth="repeat">
+      <a:schemeClr val="lt1"/>
+    </dgm:linClrLst>
+    <dgm:effectClrLst/>
+    <dgm:txLinClrLst/>
+    <dgm:txFillClrLst/>
+    <dgm:txEffectClrLst/>
+  </dgm:styleLbl>
+  <dgm:styleLbl name="asst2">
+    <dgm:fillClrLst meth="repeat">
+      <a:schemeClr val="accent6"/>
+    </dgm:fillClrLst>
+    <dgm:linClrLst meth="repeat">
+      <a:schemeClr val="lt1"/>
+    </dgm:linClrLst>
+    <dgm:effectClrLst/>
+    <dgm:txLinClrLst/>
+    <dgm:txFillClrLst/>
+    <dgm:txEffectClrLst/>
+  </dgm:styleLbl>
+  <dgm:styleLbl name="asst3">
+    <dgm:fillClrLst meth="repeat">
+      <a:schemeClr val="accent6"/>
+    </dgm:fillClrLst>
+    <dgm:linClrLst meth="repeat">
+      <a:schemeClr val="lt1"/>
+    </dgm:linClrLst>
+    <dgm:effectClrLst/>
+    <dgm:txLinClrLst/>
+    <dgm:txFillClrLst/>
+    <dgm:txEffectClrLst/>
+  </dgm:styleLbl>
+  <dgm:styleLbl name="asst4">
+    <dgm:fillClrLst meth="repeat">
+      <a:schemeClr val="accent6"/>
+    </dgm:fillClrLst>
+    <dgm:linClrLst meth="repeat">
+      <a:schemeClr val="lt1"/>
+    </dgm:linClrLst>
+    <dgm:effectClrLst/>
+    <dgm:txLinClrLst/>
+    <dgm:txFillClrLst/>
+    <dgm:txEffectClrLst/>
+  </dgm:styleLbl>
+  <dgm:styleLbl name="parChTrans2D1">
+    <dgm:fillClrLst meth="repeat">
+      <a:schemeClr val="accent6">
+        <a:tint val="60000"/>
+      </a:schemeClr>
+    </dgm:fillClrLst>
+    <dgm:linClrLst meth="repeat">
+      <a:schemeClr val="accent6">
+        <a:tint val="60000"/>
+      </a:schemeClr>
+    </dgm:linClrLst>
+    <dgm:effectClrLst/>
+    <dgm:txLinClrLst/>
+    <dgm:txFillClrLst meth="repeat">
+      <a:schemeClr val="lt1"/>
+    </dgm:txFillClrLst>
+    <dgm:txEffectClrLst/>
+  </dgm:styleLbl>
+  <dgm:styleLbl name="parChTrans2D2">
+    <dgm:fillClrLst meth="repeat">
+      <a:schemeClr val="accent6"/>
+    </dgm:fillClrLst>
+    <dgm:linClrLst meth="repeat">
+      <a:schemeClr val="accent6"/>
+    </dgm:linClrLst>
+    <dgm:effectClrLst/>
+    <dgm:txLinClrLst/>
+    <dgm:txFillClrLst meth="repeat">
+      <a:schemeClr val="lt1"/>
+    </dgm:txFillClrLst>
+    <dgm:txEffectClrLst/>
+  </dgm:styleLbl>
+  <dgm:styleLbl name="parChTrans2D3">
+    <dgm:fillClrLst meth="repeat">
+      <a:schemeClr val="accent6"/>
+    </dgm:fillClrLst>
+    <dgm:linClrLst meth="repeat">
+      <a:schemeClr val="accent6"/>
+    </dgm:linClrLst>
+    <dgm:effectClrLst/>
+    <dgm:txLinClrLst/>
+    <dgm:txFillClrLst meth="repeat">
+      <a:schemeClr val="lt1"/>
+    </dgm:txFillClrLst>
+    <dgm:txEffectClrLst/>
+  </dgm:styleLbl>
+  <dgm:styleLbl name="parChTrans2D4">
+    <dgm:fillClrLst meth="repeat">
+      <a:schemeClr val="accent6"/>
+    </dgm:fillClrLst>
+    <dgm:linClrLst meth="repeat">
+      <a:schemeClr val="accent6"/>
+    </dgm:linClrLst>
+    <dgm:effectClrLst/>
+    <dgm:txLinClrLst/>
+    <dgm:txFillClrLst meth="repeat">
+      <a:schemeClr val="lt1"/>
+    </dgm:txFillClrLst>
+    <dgm:txEffectClrLst/>
+  </dgm:styleLbl>
+  <dgm:styleLbl name="parChTrans1D1">
+    <dgm:fillClrLst meth="repeat">
+      <a:schemeClr val="accent6"/>
+    </dgm:fillClrLst>
+    <dgm:linClrLst meth="repeat">
+      <a:schemeClr val="accent6">
+        <a:shade val="60000"/>
+      </a:schemeClr>
+    </dgm:linClrLst>
+    <dgm:effectClrLst/>
+    <dgm:txLinClrLst/>
+    <dgm:txFillClrLst meth="repeat">
+      <a:schemeClr val="tx1"/>
+    </dgm:txFillClrLst>
+    <dgm:txEffectClrLst/>
+  </dgm:styleLbl>
+  <dgm:styleLbl name="parChTrans1D2">
+    <dgm:fillClrLst meth="repeat">
+      <a:schemeClr val="accent6"/>
+    </dgm:fillClrLst>
+    <dgm:linClrLst meth="repeat">
+      <a:schemeClr val="accent6">
+        <a:shade val="60000"/>
+      </a:schemeClr>
+    </dgm:linClrLst>
+    <dgm:effectClrLst/>
+    <dgm:txLinClrLst/>
+    <dgm:txFillClrLst meth="repeat">
+      <a:schemeClr val="tx1"/>
+    </dgm:txFillClrLst>
+    <dgm:txEffectClrLst/>
+  </dgm:styleLbl>
+  <dgm:styleLbl name="parChTrans1D3">
+    <dgm:fillClrLst meth="repeat">
+      <a:schemeClr val="accent6"/>
+    </dgm:fillClrLst>
+    <dgm:linClrLst meth="repeat">
+      <a:schemeClr val="accent6">
+        <a:shade val="80000"/>
+      </a:schemeClr>
+    </dgm:linClrLst>
+    <dgm:effectClrLst/>
+    <dgm:txLinClrLst/>
+    <dgm:txFillClrLst meth="repeat">
+      <a:schemeClr val="tx1"/>
+    </dgm:txFillClrLst>
+    <dgm:txEffectClrLst/>
+  </dgm:styleLbl>
+  <dgm:styleLbl name="parChTrans1D4">
+    <dgm:fillClrLst meth="repeat">
+      <a:schemeClr val="accent6"/>
+    </dgm:fillClrLst>
+    <dgm:linClrLst meth="repeat">
+      <a:schemeClr val="accent6">
+        <a:shade val="80000"/>
+      </a:schemeClr>
+    </dgm:linClrLst>
+    <dgm:effectClrLst/>
+    <dgm:txLinClrLst/>
+    <dgm:txFillClrLst meth="repeat">
+      <a:schemeClr val="tx1"/>
+    </dgm:txFillClrLst>
+    <dgm:txEffectClrLst/>
+  </dgm:styleLbl>
+  <dgm:styleLbl name="fgAcc1">
+    <dgm:fillClrLst meth="repeat">
+      <a:schemeClr val="lt1">
+        <a:alpha val="90000"/>
+      </a:schemeClr>
+    </dgm:fillClrLst>
+    <dgm:linClrLst meth="repeat">
+      <a:schemeClr val="accent6"/>
+    </dgm:linClrLst>
+    <dgm:effectClrLst/>
+    <dgm:txLinClrLst/>
+    <dgm:txFillClrLst meth="repeat">
+      <a:schemeClr val="dk1"/>
+    </dgm:txFillClrLst>
+    <dgm:txEffectClrLst/>
+  </dgm:styleLbl>
+  <dgm:styleLbl name="conFgAcc1">
+    <dgm:fillClrLst meth="repeat">
+      <a:schemeClr val="lt1">
+        <a:alpha val="90000"/>
+      </a:schemeClr>
+    </dgm:fillClrLst>
+    <dgm:linClrLst meth="repeat">
+      <a:schemeClr val="accent6"/>
+    </dgm:linClrLst>
+    <dgm:effectClrLst/>
+    <dgm:txLinClrLst/>
+    <dgm:txFillClrLst meth="repeat">
+      <a:schemeClr val="dk1"/>
+    </dgm:txFillClrLst>
+    <dgm:txEffectClrLst/>
+  </dgm:styleLbl>
+  <dgm:styleLbl name="alignAcc1">
+    <dgm:fillClrLst meth="repeat">
+      <a:schemeClr val="lt1">
+        <a:alpha val="90000"/>
+      </a:schemeClr>
+    </dgm:fillClrLst>
+    <dgm:linClrLst meth="repeat">
+      <a:schemeClr val="accent6"/>
+    </dgm:linClrLst>
+    <dgm:effectClrLst/>
+    <dgm:txLinClrLst/>
+    <dgm:txFillClrLst meth="repeat">
+      <a:schemeClr val="dk1"/>
+    </dgm:txFillClrLst>
+    <dgm:txEffectClrLst/>
+  </dgm:styleLbl>
+  <dgm:styleLbl name="trAlignAcc1">
+    <dgm:fillClrLst meth="repeat">
+      <a:schemeClr val="lt1">
+        <a:alpha val="40000"/>
+      </a:schemeClr>
+    </dgm:fillClrLst>
+    <dgm:linClrLst meth="repeat">
+      <a:schemeClr val="accent6"/>
+    </dgm:linClrLst>
+    <dgm:effectClrLst/>
+    <dgm:txLinClrLst/>
+    <dgm:txFillClrLst meth="repeat">
+      <a:schemeClr val="dk1"/>
+    </dgm:txFillClrLst>
+    <dgm:txEffectClrLst/>
+  </dgm:styleLbl>
+  <dgm:styleLbl name="bgAcc1">
+    <dgm:fillClrLst meth="repeat">
+      <a:schemeClr val="lt1">
+        <a:alpha val="90000"/>
+      </a:schemeClr>
+    </dgm:fillClrLst>
+    <dgm:linClrLst meth="repeat">
+      <a:schemeClr val="accent6"/>
+    </dgm:linClrLst>
+    <dgm:effectClrLst/>
+    <dgm:txLinClrLst/>
+    <dgm:txFillClrLst meth="repeat">
+      <a:schemeClr val="dk1"/>
+    </dgm:txFillClrLst>
+    <dgm:txEffectClrLst/>
+  </dgm:styleLbl>
+  <dgm:styleLbl name="solidFgAcc1">
+    <dgm:fillClrLst meth="repeat">
+      <a:schemeClr val="lt1"/>
+    </dgm:fillClrLst>
+    <dgm:linClrLst meth="repeat">
+      <a:schemeClr val="accent6"/>
+    </dgm:linClrLst>
+    <dgm:effectClrLst/>
+    <dgm:txLinClrLst/>
+    <dgm:txFillClrLst meth="repeat">
+      <a:schemeClr val="dk1"/>
+    </dgm:txFillClrLst>
+    <dgm:txEffectClrLst/>
+  </dgm:styleLbl>
+  <dgm:styleLbl name="solidAlignAcc1">
+    <dgm:fillClrLst meth="repeat">
+      <a:schemeClr val="lt1"/>
+    </dgm:fillClrLst>
+    <dgm:linClrLst meth="repeat">
+      <a:schemeClr val="accent6"/>
+    </dgm:linClrLst>
+    <dgm:effectClrLst/>
+    <dgm:txLinClrLst/>
+    <dgm:txFillClrLst meth="repeat">
+      <a:schemeClr val="dk1"/>
+    </dgm:txFillClrLst>
+    <dgm:txEffectClrLst/>
+  </dgm:styleLbl>
+  <dgm:styleLbl name="solidBgAcc1">
+    <dgm:fillClrLst meth="repeat">
+      <a:schemeClr val="lt1"/>
+    </dgm:fillClrLst>
+    <dgm:linClrLst meth="repeat">
+      <a:schemeClr val="accent6"/>
+    </dgm:linClrLst>
+    <dgm:effectClrLst/>
+    <dgm:txLinClrLst/>
+    <dgm:txFillClrLst meth="repeat">
+      <a:schemeClr val="dk1"/>
+    </dgm:txFillClrLst>
+    <dgm:txEffectClrLst/>
+  </dgm:styleLbl>
+  <dgm:styleLbl name="fgAccFollowNode1">
+    <dgm:fillClrLst meth="repeat">
+      <a:schemeClr val="accent6">
+        <a:alpha val="90000"/>
+        <a:tint val="40000"/>
+      </a:schemeClr>
+    </dgm:fillClrLst>
+    <dgm:linClrLst meth="repeat">
+      <a:schemeClr val="accent6">
+        <a:alpha val="90000"/>
+        <a:tint val="40000"/>
+      </a:schemeClr>
+    </dgm:linClrLst>
+    <dgm:effectClrLst/>
+    <dgm:txLinClrLst/>
+    <dgm:txFillClrLst meth="repeat">
+      <a:schemeClr val="dk1"/>
+    </dgm:txFillClrLst>
+    <dgm:txEffectClrLst/>
+  </dgm:styleLbl>
+  <dgm:styleLbl name="alignAccFollowNode1">
+    <dgm:fillClrLst meth="repeat">
+      <a:schemeClr val="accent6">
+        <a:alpha val="90000"/>
+        <a:tint val="40000"/>
+      </a:schemeClr>
+    </dgm:fillClrLst>
+    <dgm:linClrLst meth="repeat">
+      <a:schemeClr val="accent6">
+        <a:alpha val="90000"/>
+        <a:tint val="40000"/>
+      </a:schemeClr>
+    </dgm:linClrLst>
+    <dgm:effectClrLst/>
+    <dgm:txLinClrLst/>
+    <dgm:txFillClrLst meth="repeat">
+      <a:schemeClr val="dk1"/>
+    </dgm:txFillClrLst>
+    <dgm:txEffectClrLst/>
+  </dgm:styleLbl>
+  <dgm:styleLbl name="bgAccFollowNode1">
+    <dgm:fillClrLst meth="repeat">
+      <a:schemeClr val="accent6">
+        <a:alpha val="90000"/>
+        <a:tint val="40000"/>
+      </a:schemeClr>
+    </dgm:fillClrLst>
+    <dgm:linClrLst meth="repeat">
+      <a:schemeClr val="accent6">
+        <a:alpha val="90000"/>
+        <a:tint val="40000"/>
+      </a:schemeClr>
+    </dgm:linClrLst>
+    <dgm:effectClrLst/>
+    <dgm:txLinClrLst/>
+    <dgm:txFillClrLst meth="repeat">
+      <a:schemeClr val="dk1"/>
+    </dgm:txFillClrLst>
+    <dgm:txEffectClrLst/>
+  </dgm:styleLbl>
+  <dgm:styleLbl name="fgAcc0">
+    <dgm:fillClrLst meth="repeat">
+      <a:schemeClr val="lt1">
+        <a:alpha val="90000"/>
+      </a:schemeClr>
+    </dgm:fillClrLst>
+    <dgm:linClrLst meth="repeat">
+      <a:schemeClr val="accent6"/>
+    </dgm:linClrLst>
+    <dgm:effectClrLst/>
+    <dgm:txLinClrLst/>
+    <dgm:txFillClrLst meth="repeat">
+      <a:schemeClr val="dk1"/>
+    </dgm:txFillClrLst>
+    <dgm:txEffectClrLst/>
+  </dgm:styleLbl>
+  <dgm:styleLbl name="fgAcc2">
+    <dgm:fillClrLst meth="repeat">
+      <a:schemeClr val="lt1">
+        <a:alpha val="90000"/>
+      </a:schemeClr>
+    </dgm:fillClrLst>
+    <dgm:linClrLst meth="repeat">
+      <a:schemeClr val="accent6"/>
+    </dgm:linClrLst>
+    <dgm:effectClrLst/>
+    <dgm:txLinClrLst/>
+    <dgm:txFillClrLst meth="repeat">
+      <a:schemeClr val="dk1"/>
+    </dgm:txFillClrLst>
+    <dgm:txEffectClrLst/>
+  </dgm:styleLbl>
+  <dgm:styleLbl name="fgAcc3">
+    <dgm:fillClrLst meth="repeat">
+      <a:schemeClr val="lt1">
+        <a:alpha val="90000"/>
+      </a:schemeClr>
+    </dgm:fillClrLst>
+    <dgm:linClrLst meth="repeat">
+      <a:schemeClr val="accent6"/>
+    </dgm:linClrLst>
+    <dgm:effectClrLst/>
+    <dgm:txLinClrLst/>
+    <dgm:txFillClrLst meth="repeat">
+      <a:schemeClr val="dk1"/>
+    </dgm:txFillClrLst>
+    <dgm:txEffectClrLst/>
+  </dgm:styleLbl>
+  <dgm:styleLbl name="fgAcc4">
+    <dgm:fillClrLst meth="repeat">
+      <a:schemeClr val="lt1">
+        <a:alpha val="90000"/>
+      </a:schemeClr>
+    </dgm:fillClrLst>
+    <dgm:linClrLst meth="repeat">
+      <a:schemeClr val="accent6"/>
+    </dgm:linClrLst>
+    <dgm:effectClrLst/>
+    <dgm:txLinClrLst/>
+    <dgm:txFillClrLst meth="repeat">
+      <a:schemeClr val="dk1"/>
+    </dgm:txFillClrLst>
+    <dgm:txEffectClrLst/>
+  </dgm:styleLbl>
+  <dgm:styleLbl name="bgShp">
+    <dgm:fillClrLst meth="repeat">
+      <a:schemeClr val="accent6">
+        <a:tint val="40000"/>
+      </a:schemeClr>
+    </dgm:fillClrLst>
+    <dgm:linClrLst meth="repeat">
+      <a:schemeClr val="accent6"/>
+    </dgm:linClrLst>
+    <dgm:effectClrLst/>
+    <dgm:txLinClrLst/>
+    <dgm:txFillClrLst meth="repeat">
+      <a:schemeClr val="dk1"/>
+    </dgm:txFillClrLst>
+    <dgm:txEffectClrLst/>
+  </dgm:styleLbl>
+  <dgm:styleLbl name="dkBgShp">
+    <dgm:fillClrLst meth="repeat">
+      <a:schemeClr val="accent6">
+        <a:shade val="80000"/>
+      </a:schemeClr>
+    </dgm:fillClrLst>
+    <dgm:linClrLst meth="repeat">
+      <a:schemeClr val="accent6"/>
+    </dgm:linClrLst>
+    <dgm:effectClrLst/>
+    <dgm:txLinClrLst/>
+    <dgm:txFillClrLst meth="repeat">
+      <a:schemeClr val="lt1"/>
+    </dgm:txFillClrLst>
+    <dgm:txEffectClrLst/>
+  </dgm:styleLbl>
+  <dgm:styleLbl name="trBgShp">
+    <dgm:fillClrLst meth="repeat">
+      <a:schemeClr val="accent6">
+        <a:tint val="50000"/>
+        <a:alpha val="40000"/>
+      </a:schemeClr>
+    </dgm:fillClrLst>
+    <dgm:linClrLst meth="repeat">
+      <a:schemeClr val="accent6"/>
+    </dgm:linClrLst>
+    <dgm:effectClrLst/>
+    <dgm:txLinClrLst/>
+    <dgm:txFillClrLst meth="repeat">
+      <a:schemeClr val="lt1"/>
+    </dgm:txFillClrLst>
+    <dgm:txEffectClrLst/>
+  </dgm:styleLbl>
+  <dgm:styleLbl name="fgShp">
+    <dgm:fillClrLst meth="repeat">
+      <a:schemeClr val="accent6">
+        <a:tint val="60000"/>
+      </a:schemeClr>
+    </dgm:fillClrLst>
+    <dgm:linClrLst meth="repeat">
+      <a:schemeClr val="lt1"/>
+    </dgm:linClrLst>
+    <dgm:effectClrLst/>
+    <dgm:txLinClrLst/>
+    <dgm:txFillClrLst meth="repeat">
+      <a:schemeClr val="dk1"/>
+    </dgm:txFillClrLst>
+    <dgm:txEffectClrLst/>
+  </dgm:styleLbl>
+  <dgm:styleLbl name="revTx">
+    <dgm:fillClrLst meth="repeat">
+      <a:schemeClr val="lt1">
+        <a:alpha val="0"/>
+      </a:schemeClr>
+    </dgm:fillClrLst>
+    <dgm:linClrLst meth="repeat">
+      <a:schemeClr val="dk1">
+        <a:alpha val="0"/>
+      </a:schemeClr>
+    </dgm:linClrLst>
+    <dgm:effectClrLst/>
+    <dgm:txLinClrLst/>
+    <dgm:txFillClrLst meth="repeat">
+      <a:schemeClr val="tx1"/>
+    </dgm:txFillClrLst>
+    <dgm:txEffectClrLst/>
+  </dgm:styleLbl>
+</dgm:colorsDef>
+</file>
+
+<file path=ppt/diagrams/data1.xml><?xml version="1.0" encoding="utf-8"?>
+<dgm:dataModel xmlns:dgm="http://schemas.openxmlformats.org/drawingml/2006/diagram" xmlns:a="http://schemas.openxmlformats.org/drawingml/2006/main">
+  <dgm:ptLst>
+    <dgm:pt modelId="{6A8034CB-043C-45EE-8B6B-095A2211D74F}" type="doc">
+      <dgm:prSet loTypeId="urn:microsoft.com/office/officeart/2005/8/layout/hProcess9" loCatId="process" qsTypeId="urn:microsoft.com/office/officeart/2005/8/quickstyle/simple1" qsCatId="simple" csTypeId="urn:microsoft.com/office/officeart/2005/8/colors/accent6_2" csCatId="accent6" phldr="1"/>
+      <dgm:spPr/>
+    </dgm:pt>
+    <dgm:pt modelId="{D1F1B704-81CA-471A-8133-EE0E3D2F6951}">
+      <dgm:prSet phldrT="[Text]" custT="1"/>
+      <dgm:spPr/>
+      <dgm:t>
+        <a:bodyPr/>
+        <a:lstStyle/>
+        <a:p>
+          <a:r>
+            <a:rPr lang="en-US" sz="3000" dirty="0"/>
+            <a:t>Create account</a:t>
+          </a:r>
+        </a:p>
+      </dgm:t>
+    </dgm:pt>
+    <dgm:pt modelId="{4E80A486-C72F-46EE-9BB7-AC769871A236}" type="parTrans" cxnId="{B7593062-A525-4115-82C7-8566F21A7AE7}">
+      <dgm:prSet/>
+      <dgm:spPr/>
+      <dgm:t>
+        <a:bodyPr/>
+        <a:lstStyle/>
+        <a:p>
+          <a:endParaRPr lang="en-US" sz="3000"/>
+        </a:p>
+      </dgm:t>
+    </dgm:pt>
+    <dgm:pt modelId="{451F7807-C34B-4DDD-8F19-D7E1D8C5A560}" type="sibTrans" cxnId="{B7593062-A525-4115-82C7-8566F21A7AE7}">
+      <dgm:prSet/>
+      <dgm:spPr/>
+      <dgm:t>
+        <a:bodyPr/>
+        <a:lstStyle/>
+        <a:p>
+          <a:endParaRPr lang="en-US" sz="3000"/>
+        </a:p>
+      </dgm:t>
+    </dgm:pt>
+    <dgm:pt modelId="{33BBA62F-C389-45AD-A644-2F0235DE97FC}">
+      <dgm:prSet phldrT="[Text]" custT="1"/>
+      <dgm:spPr/>
+      <dgm:t>
+        <a:bodyPr/>
+        <a:lstStyle/>
+        <a:p>
+          <a:r>
+            <a:rPr lang="en-US" sz="3000" dirty="0"/>
+            <a:t>Submit code for designated analysis</a:t>
+          </a:r>
+        </a:p>
+      </dgm:t>
+    </dgm:pt>
+    <dgm:pt modelId="{915E3DAF-66AA-4558-87D8-4ECC6074BA1C}" type="parTrans" cxnId="{03EDEC9F-1EA1-4C37-8238-31C30558BFA1}">
+      <dgm:prSet/>
+      <dgm:spPr/>
+      <dgm:t>
+        <a:bodyPr/>
+        <a:lstStyle/>
+        <a:p>
+          <a:endParaRPr lang="en-US" sz="3000"/>
+        </a:p>
+      </dgm:t>
+    </dgm:pt>
+    <dgm:pt modelId="{DBC9A436-B550-4FFF-A012-CB1D509F3DDE}" type="sibTrans" cxnId="{03EDEC9F-1EA1-4C37-8238-31C30558BFA1}">
+      <dgm:prSet/>
+      <dgm:spPr/>
+      <dgm:t>
+        <a:bodyPr/>
+        <a:lstStyle/>
+        <a:p>
+          <a:endParaRPr lang="en-US" sz="3000"/>
+        </a:p>
+      </dgm:t>
+    </dgm:pt>
+    <dgm:pt modelId="{041A0D64-B221-4E0C-A62C-1D39967348B1}">
+      <dgm:prSet phldrT="[Text]" custT="1"/>
+      <dgm:spPr/>
+      <dgm:t>
+        <a:bodyPr/>
+        <a:lstStyle/>
+        <a:p>
+          <a:r>
+            <a:rPr lang="en-US" sz="3000" dirty="0"/>
+            <a:t>Code runs on validation engine</a:t>
+          </a:r>
+        </a:p>
+      </dgm:t>
+    </dgm:pt>
+    <dgm:pt modelId="{97CF7EE5-00AC-4004-A770-B42F19BC9889}" type="parTrans" cxnId="{6775F046-34CA-49DF-A1B3-AD41982A1AE9}">
+      <dgm:prSet/>
+      <dgm:spPr/>
+      <dgm:t>
+        <a:bodyPr/>
+        <a:lstStyle/>
+        <a:p>
+          <a:endParaRPr lang="en-US" sz="3000"/>
+        </a:p>
+      </dgm:t>
+    </dgm:pt>
+    <dgm:pt modelId="{36937A4A-1BF2-46F5-ABDF-3C3B0B05F190}" type="sibTrans" cxnId="{6775F046-34CA-49DF-A1B3-AD41982A1AE9}">
+      <dgm:prSet/>
+      <dgm:spPr/>
+      <dgm:t>
+        <a:bodyPr/>
+        <a:lstStyle/>
+        <a:p>
+          <a:endParaRPr lang="en-US" sz="3000"/>
+        </a:p>
+      </dgm:t>
+    </dgm:pt>
+    <dgm:pt modelId="{4D1750A9-DE59-4C85-89B1-77C00D90F4DD}">
+      <dgm:prSet phldrT="[Text]" custT="1"/>
+      <dgm:spPr/>
+      <dgm:t>
+        <a:bodyPr/>
+        <a:lstStyle/>
+        <a:p>
+          <a:r>
+            <a:rPr lang="en-US" sz="3000" dirty="0"/>
+            <a:t>Leaderboard updated</a:t>
+          </a:r>
+        </a:p>
+      </dgm:t>
+    </dgm:pt>
+    <dgm:pt modelId="{B03473F9-62EF-43CE-BEF3-D580A0A6B087}" type="parTrans" cxnId="{026FABC5-A269-4C00-BD9B-506715A4DCD4}">
+      <dgm:prSet/>
+      <dgm:spPr/>
+      <dgm:t>
+        <a:bodyPr/>
+        <a:lstStyle/>
+        <a:p>
+          <a:endParaRPr lang="en-US" sz="3000"/>
+        </a:p>
+      </dgm:t>
+    </dgm:pt>
+    <dgm:pt modelId="{D0759F56-993C-4CF5-8B4B-91DA0311B7CA}" type="sibTrans" cxnId="{026FABC5-A269-4C00-BD9B-506715A4DCD4}">
+      <dgm:prSet/>
+      <dgm:spPr/>
+      <dgm:t>
+        <a:bodyPr/>
+        <a:lstStyle/>
+        <a:p>
+          <a:endParaRPr lang="en-US" sz="3000"/>
+        </a:p>
+      </dgm:t>
+    </dgm:pt>
+    <dgm:pt modelId="{2764DAF1-E2E2-4F6E-BAA6-3F03CC28CB8E}">
+      <dgm:prSet phldrT="[Text]" custT="1"/>
+      <dgm:spPr/>
+      <dgm:t>
+        <a:bodyPr/>
+        <a:lstStyle/>
+        <a:p>
+          <a:r>
+            <a:rPr lang="en-US" sz="3000" dirty="0"/>
+            <a:t>Private report sent to developer</a:t>
+          </a:r>
+        </a:p>
+      </dgm:t>
+    </dgm:pt>
+    <dgm:pt modelId="{7B6903C8-D183-4EC1-AA61-19F94F639F69}" type="parTrans" cxnId="{7264D472-A277-46E9-B48D-EFC1FF3DBC94}">
+      <dgm:prSet/>
+      <dgm:spPr/>
+      <dgm:t>
+        <a:bodyPr/>
+        <a:lstStyle/>
+        <a:p>
+          <a:endParaRPr lang="en-US" sz="3000"/>
+        </a:p>
+      </dgm:t>
+    </dgm:pt>
+    <dgm:pt modelId="{7B2C1AEB-8A02-4DFB-9A00-BC0A2F9B3769}" type="sibTrans" cxnId="{7264D472-A277-46E9-B48D-EFC1FF3DBC94}">
+      <dgm:prSet/>
+      <dgm:spPr/>
+      <dgm:t>
+        <a:bodyPr/>
+        <a:lstStyle/>
+        <a:p>
+          <a:endParaRPr lang="en-US" sz="3000"/>
+        </a:p>
+      </dgm:t>
+    </dgm:pt>
+    <dgm:pt modelId="{E13CFA51-BAFD-47D3-A849-7BC63DCE610C}" type="pres">
+      <dgm:prSet presAssocID="{6A8034CB-043C-45EE-8B6B-095A2211D74F}" presName="CompostProcess" presStyleCnt="0">
+        <dgm:presLayoutVars>
+          <dgm:dir/>
+          <dgm:resizeHandles val="exact"/>
+        </dgm:presLayoutVars>
+      </dgm:prSet>
+      <dgm:spPr/>
+    </dgm:pt>
+    <dgm:pt modelId="{C301A2AA-87E6-4235-9010-3D0F7DB9878D}" type="pres">
+      <dgm:prSet presAssocID="{6A8034CB-043C-45EE-8B6B-095A2211D74F}" presName="arrow" presStyleLbl="bgShp" presStyleIdx="0" presStyleCnt="1"/>
+      <dgm:spPr>
+        <a:solidFill>
+          <a:schemeClr val="accent5">
+            <a:lumMod val="50000"/>
+          </a:schemeClr>
+        </a:solidFill>
+      </dgm:spPr>
+    </dgm:pt>
+    <dgm:pt modelId="{755CA1A3-AA5E-4406-800C-BD410E70EB7E}" type="pres">
+      <dgm:prSet presAssocID="{6A8034CB-043C-45EE-8B6B-095A2211D74F}" presName="linearProcess" presStyleCnt="0"/>
+      <dgm:spPr/>
+    </dgm:pt>
+    <dgm:pt modelId="{C279468B-E291-4967-A3D5-C1B003D36A8F}" type="pres">
+      <dgm:prSet presAssocID="{D1F1B704-81CA-471A-8133-EE0E3D2F6951}" presName="textNode" presStyleLbl="node1" presStyleIdx="0" presStyleCnt="5">
+        <dgm:presLayoutVars>
+          <dgm:bulletEnabled val="1"/>
+        </dgm:presLayoutVars>
+      </dgm:prSet>
+      <dgm:spPr/>
+    </dgm:pt>
+    <dgm:pt modelId="{39079CB2-5E85-4388-B4BD-E8C28ABA7572}" type="pres">
+      <dgm:prSet presAssocID="{451F7807-C34B-4DDD-8F19-D7E1D8C5A560}" presName="sibTrans" presStyleCnt="0"/>
+      <dgm:spPr/>
+    </dgm:pt>
+    <dgm:pt modelId="{CA56E845-A6C3-4D66-9B1D-6CB595A80B7F}" type="pres">
+      <dgm:prSet presAssocID="{33BBA62F-C389-45AD-A644-2F0235DE97FC}" presName="textNode" presStyleLbl="node1" presStyleIdx="1" presStyleCnt="5">
+        <dgm:presLayoutVars>
+          <dgm:bulletEnabled val="1"/>
+        </dgm:presLayoutVars>
+      </dgm:prSet>
+      <dgm:spPr/>
+    </dgm:pt>
+    <dgm:pt modelId="{1BB15BB9-920F-45AB-B11F-AFF5535AEA51}" type="pres">
+      <dgm:prSet presAssocID="{DBC9A436-B550-4FFF-A012-CB1D509F3DDE}" presName="sibTrans" presStyleCnt="0"/>
+      <dgm:spPr/>
+    </dgm:pt>
+    <dgm:pt modelId="{B82B18AA-EF92-4932-B4FB-2F5F1342087F}" type="pres">
+      <dgm:prSet presAssocID="{041A0D64-B221-4E0C-A62C-1D39967348B1}" presName="textNode" presStyleLbl="node1" presStyleIdx="2" presStyleCnt="5" custLinFactNeighborX="7005" custLinFactNeighborY="-1308">
+        <dgm:presLayoutVars>
+          <dgm:bulletEnabled val="1"/>
+        </dgm:presLayoutVars>
+      </dgm:prSet>
+      <dgm:spPr/>
+    </dgm:pt>
+    <dgm:pt modelId="{71CE91D0-B708-4FA4-BE10-665CD865C0A1}" type="pres">
+      <dgm:prSet presAssocID="{36937A4A-1BF2-46F5-ABDF-3C3B0B05F190}" presName="sibTrans" presStyleCnt="0"/>
+      <dgm:spPr/>
+    </dgm:pt>
+    <dgm:pt modelId="{642E9D7F-E2D9-4F7D-9D1D-C774EFC17DE8}" type="pres">
+      <dgm:prSet presAssocID="{4D1750A9-DE59-4C85-89B1-77C00D90F4DD}" presName="textNode" presStyleLbl="node1" presStyleIdx="3" presStyleCnt="5">
+        <dgm:presLayoutVars>
+          <dgm:bulletEnabled val="1"/>
+        </dgm:presLayoutVars>
+      </dgm:prSet>
+      <dgm:spPr/>
+    </dgm:pt>
+    <dgm:pt modelId="{23BCCC6D-5A2D-4786-BD3B-B3DE173FDAD4}" type="pres">
+      <dgm:prSet presAssocID="{D0759F56-993C-4CF5-8B4B-91DA0311B7CA}" presName="sibTrans" presStyleCnt="0"/>
+      <dgm:spPr/>
+    </dgm:pt>
+    <dgm:pt modelId="{2DE841E0-E6A1-4356-850D-7AD0D2D4040E}" type="pres">
+      <dgm:prSet presAssocID="{2764DAF1-E2E2-4F6E-BAA6-3F03CC28CB8E}" presName="textNode" presStyleLbl="node1" presStyleIdx="4" presStyleCnt="5">
+        <dgm:presLayoutVars>
+          <dgm:bulletEnabled val="1"/>
+        </dgm:presLayoutVars>
+      </dgm:prSet>
+      <dgm:spPr/>
+    </dgm:pt>
+  </dgm:ptLst>
+  <dgm:cxnLst>
+    <dgm:cxn modelId="{B7593062-A525-4115-82C7-8566F21A7AE7}" srcId="{6A8034CB-043C-45EE-8B6B-095A2211D74F}" destId="{D1F1B704-81CA-471A-8133-EE0E3D2F6951}" srcOrd="0" destOrd="0" parTransId="{4E80A486-C72F-46EE-9BB7-AC769871A236}" sibTransId="{451F7807-C34B-4DDD-8F19-D7E1D8C5A560}"/>
+    <dgm:cxn modelId="{A4927264-30A6-4C10-AEE2-82E6A72767F1}" type="presOf" srcId="{6A8034CB-043C-45EE-8B6B-095A2211D74F}" destId="{E13CFA51-BAFD-47D3-A849-7BC63DCE610C}" srcOrd="0" destOrd="0" presId="urn:microsoft.com/office/officeart/2005/8/layout/hProcess9"/>
+    <dgm:cxn modelId="{6775F046-34CA-49DF-A1B3-AD41982A1AE9}" srcId="{6A8034CB-043C-45EE-8B6B-095A2211D74F}" destId="{041A0D64-B221-4E0C-A62C-1D39967348B1}" srcOrd="2" destOrd="0" parTransId="{97CF7EE5-00AC-4004-A770-B42F19BC9889}" sibTransId="{36937A4A-1BF2-46F5-ABDF-3C3B0B05F190}"/>
+    <dgm:cxn modelId="{3713426C-FCC5-4134-84F6-C1A6F730DFBE}" type="presOf" srcId="{33BBA62F-C389-45AD-A644-2F0235DE97FC}" destId="{CA56E845-A6C3-4D66-9B1D-6CB595A80B7F}" srcOrd="0" destOrd="0" presId="urn:microsoft.com/office/officeart/2005/8/layout/hProcess9"/>
+    <dgm:cxn modelId="{7264D472-A277-46E9-B48D-EFC1FF3DBC94}" srcId="{6A8034CB-043C-45EE-8B6B-095A2211D74F}" destId="{2764DAF1-E2E2-4F6E-BAA6-3F03CC28CB8E}" srcOrd="4" destOrd="0" parTransId="{7B6903C8-D183-4EC1-AA61-19F94F639F69}" sibTransId="{7B2C1AEB-8A02-4DFB-9A00-BC0A2F9B3769}"/>
+    <dgm:cxn modelId="{388E7E75-0AD1-48F7-8CA4-DD33A87163F6}" type="presOf" srcId="{4D1750A9-DE59-4C85-89B1-77C00D90F4DD}" destId="{642E9D7F-E2D9-4F7D-9D1D-C774EFC17DE8}" srcOrd="0" destOrd="0" presId="urn:microsoft.com/office/officeart/2005/8/layout/hProcess9"/>
+    <dgm:cxn modelId="{03EDEC9F-1EA1-4C37-8238-31C30558BFA1}" srcId="{6A8034CB-043C-45EE-8B6B-095A2211D74F}" destId="{33BBA62F-C389-45AD-A644-2F0235DE97FC}" srcOrd="1" destOrd="0" parTransId="{915E3DAF-66AA-4558-87D8-4ECC6074BA1C}" sibTransId="{DBC9A436-B550-4FFF-A012-CB1D509F3DDE}"/>
+    <dgm:cxn modelId="{026FABC5-A269-4C00-BD9B-506715A4DCD4}" srcId="{6A8034CB-043C-45EE-8B6B-095A2211D74F}" destId="{4D1750A9-DE59-4C85-89B1-77C00D90F4DD}" srcOrd="3" destOrd="0" parTransId="{B03473F9-62EF-43CE-BEF3-D580A0A6B087}" sibTransId="{D0759F56-993C-4CF5-8B4B-91DA0311B7CA}"/>
+    <dgm:cxn modelId="{815467C9-CC3C-496C-A336-F979076F5A0B}" type="presOf" srcId="{D1F1B704-81CA-471A-8133-EE0E3D2F6951}" destId="{C279468B-E291-4967-A3D5-C1B003D36A8F}" srcOrd="0" destOrd="0" presId="urn:microsoft.com/office/officeart/2005/8/layout/hProcess9"/>
+    <dgm:cxn modelId="{A9AB26EE-1542-49BF-9CCF-D14064603E79}" type="presOf" srcId="{041A0D64-B221-4E0C-A62C-1D39967348B1}" destId="{B82B18AA-EF92-4932-B4FB-2F5F1342087F}" srcOrd="0" destOrd="0" presId="urn:microsoft.com/office/officeart/2005/8/layout/hProcess9"/>
+    <dgm:cxn modelId="{DE4159F7-F869-4B4C-9952-7ECCA0B0B8CD}" type="presOf" srcId="{2764DAF1-E2E2-4F6E-BAA6-3F03CC28CB8E}" destId="{2DE841E0-E6A1-4356-850D-7AD0D2D4040E}" srcOrd="0" destOrd="0" presId="urn:microsoft.com/office/officeart/2005/8/layout/hProcess9"/>
+    <dgm:cxn modelId="{01B22384-B143-44F6-BC8B-5FF4A62F9496}" type="presParOf" srcId="{E13CFA51-BAFD-47D3-A849-7BC63DCE610C}" destId="{C301A2AA-87E6-4235-9010-3D0F7DB9878D}" srcOrd="0" destOrd="0" presId="urn:microsoft.com/office/officeart/2005/8/layout/hProcess9"/>
+    <dgm:cxn modelId="{A03EF5E5-3841-4E32-A541-464A550CDF69}" type="presParOf" srcId="{E13CFA51-BAFD-47D3-A849-7BC63DCE610C}" destId="{755CA1A3-AA5E-4406-800C-BD410E70EB7E}" srcOrd="1" destOrd="0" presId="urn:microsoft.com/office/officeart/2005/8/layout/hProcess9"/>
+    <dgm:cxn modelId="{EF04726D-75A6-4963-8DB2-29045F68ED1E}" type="presParOf" srcId="{755CA1A3-AA5E-4406-800C-BD410E70EB7E}" destId="{C279468B-E291-4967-A3D5-C1B003D36A8F}" srcOrd="0" destOrd="0" presId="urn:microsoft.com/office/officeart/2005/8/layout/hProcess9"/>
+    <dgm:cxn modelId="{B979AEC9-9B6A-4C51-BB00-097940B31083}" type="presParOf" srcId="{755CA1A3-AA5E-4406-800C-BD410E70EB7E}" destId="{39079CB2-5E85-4388-B4BD-E8C28ABA7572}" srcOrd="1" destOrd="0" presId="urn:microsoft.com/office/officeart/2005/8/layout/hProcess9"/>
+    <dgm:cxn modelId="{45FDF5C2-C4B5-4CBC-B3A2-2D7B4685906C}" type="presParOf" srcId="{755CA1A3-AA5E-4406-800C-BD410E70EB7E}" destId="{CA56E845-A6C3-4D66-9B1D-6CB595A80B7F}" srcOrd="2" destOrd="0" presId="urn:microsoft.com/office/officeart/2005/8/layout/hProcess9"/>
+    <dgm:cxn modelId="{99585986-940A-4CDE-A77E-EA55171828D2}" type="presParOf" srcId="{755CA1A3-AA5E-4406-800C-BD410E70EB7E}" destId="{1BB15BB9-920F-45AB-B11F-AFF5535AEA51}" srcOrd="3" destOrd="0" presId="urn:microsoft.com/office/officeart/2005/8/layout/hProcess9"/>
+    <dgm:cxn modelId="{553DE0C7-A46E-4C95-8F40-5CEFCF5CA7D4}" type="presParOf" srcId="{755CA1A3-AA5E-4406-800C-BD410E70EB7E}" destId="{B82B18AA-EF92-4932-B4FB-2F5F1342087F}" srcOrd="4" destOrd="0" presId="urn:microsoft.com/office/officeart/2005/8/layout/hProcess9"/>
+    <dgm:cxn modelId="{6740F808-9113-4EDA-BE40-9062414C86BB}" type="presParOf" srcId="{755CA1A3-AA5E-4406-800C-BD410E70EB7E}" destId="{71CE91D0-B708-4FA4-BE10-665CD865C0A1}" srcOrd="5" destOrd="0" presId="urn:microsoft.com/office/officeart/2005/8/layout/hProcess9"/>
+    <dgm:cxn modelId="{422C5E20-D853-49C8-864E-290CBF8894FD}" type="presParOf" srcId="{755CA1A3-AA5E-4406-800C-BD410E70EB7E}" destId="{642E9D7F-E2D9-4F7D-9D1D-C774EFC17DE8}" srcOrd="6" destOrd="0" presId="urn:microsoft.com/office/officeart/2005/8/layout/hProcess9"/>
+    <dgm:cxn modelId="{1BB9B4BD-218B-4E9E-9E4F-661E619E8D79}" type="presParOf" srcId="{755CA1A3-AA5E-4406-800C-BD410E70EB7E}" destId="{23BCCC6D-5A2D-4786-BD3B-B3DE173FDAD4}" srcOrd="7" destOrd="0" presId="urn:microsoft.com/office/officeart/2005/8/layout/hProcess9"/>
+    <dgm:cxn modelId="{DB301081-E539-4066-9AF9-A7815AC91F91}" type="presParOf" srcId="{755CA1A3-AA5E-4406-800C-BD410E70EB7E}" destId="{2DE841E0-E6A1-4356-850D-7AD0D2D4040E}" srcOrd="8" destOrd="0" presId="urn:microsoft.com/office/officeart/2005/8/layout/hProcess9"/>
+  </dgm:cxnLst>
+  <dgm:bg/>
+  <dgm:whole/>
+  <dgm:extLst>
+    <a:ext uri="http://schemas.microsoft.com/office/drawing/2008/diagram">
+      <dsp:dataModelExt xmlns:dsp="http://schemas.microsoft.com/office/drawing/2008/diagram" relId="rId13" minVer="http://schemas.openxmlformats.org/drawingml/2006/diagram"/>
+    </a:ext>
+    <a:ext uri="{C62137D5-CB1D-491B-B009-E17868A290BF}">
+      <dgm14:recolorImg xmlns:dgm14="http://schemas.microsoft.com/office/drawing/2010/diagram" val="1"/>
+    </a:ext>
+  </dgm:extLst>
+</dgm:dataModel>
+</file>
+
+<file path=ppt/diagrams/drawing1.xml><?xml version="1.0" encoding="utf-8"?>
+<dsp:drawing xmlns:dgm="http://schemas.openxmlformats.org/drawingml/2006/diagram" xmlns:dsp="http://schemas.microsoft.com/office/drawing/2008/diagram" xmlns:a="http://schemas.openxmlformats.org/drawingml/2006/main">
+  <dsp:spTree>
+    <dsp:nvGrpSpPr>
+      <dsp:cNvPr id="0" name=""/>
+      <dsp:cNvGrpSpPr/>
+    </dsp:nvGrpSpPr>
+    <dsp:grpSpPr/>
+    <dsp:sp modelId="{C301A2AA-87E6-4235-9010-3D0F7DB9878D}">
+      <dsp:nvSpPr>
+        <dsp:cNvPr id="0" name=""/>
+        <dsp:cNvSpPr/>
+      </dsp:nvSpPr>
+      <dsp:spPr>
+        <a:xfrm>
+          <a:off x="1115800" y="0"/>
+          <a:ext cx="12645733" cy="4733509"/>
+        </a:xfrm>
+        <a:prstGeom prst="rightArrow">
+          <a:avLst/>
+        </a:prstGeom>
+        <a:solidFill>
+          <a:schemeClr val="accent5">
+            <a:lumMod val="50000"/>
+          </a:schemeClr>
+        </a:solidFill>
+        <a:ln>
+          <a:noFill/>
+        </a:ln>
+        <a:effectLst/>
+      </dsp:spPr>
+      <dsp:style>
+        <a:lnRef idx="0">
+          <a:scrgbClr r="0" g="0" b="0"/>
+        </a:lnRef>
+        <a:fillRef idx="1">
+          <a:scrgbClr r="0" g="0" b="0"/>
+        </a:fillRef>
+        <a:effectRef idx="0">
+          <a:scrgbClr r="0" g="0" b="0"/>
+        </a:effectRef>
+        <a:fontRef idx="minor"/>
+      </dsp:style>
+    </dsp:sp>
+    <dsp:sp modelId="{C279468B-E291-4967-A3D5-C1B003D36A8F}">
+      <dsp:nvSpPr>
+        <dsp:cNvPr id="0" name=""/>
+        <dsp:cNvSpPr/>
+      </dsp:nvSpPr>
+      <dsp:spPr>
+        <a:xfrm>
+          <a:off x="4358" y="1420052"/>
+          <a:ext cx="2623873" cy="1893403"/>
+        </a:xfrm>
+        <a:prstGeom prst="roundRect">
+          <a:avLst/>
+        </a:prstGeom>
+        <a:solidFill>
+          <a:schemeClr val="accent6">
+            <a:hueOff val="0"/>
+            <a:satOff val="0"/>
+            <a:lumOff val="0"/>
+            <a:alphaOff val="0"/>
+          </a:schemeClr>
+        </a:solidFill>
+        <a:ln w="25400" cap="flat" cmpd="sng" algn="ctr">
+          <a:solidFill>
+            <a:schemeClr val="lt1">
+              <a:hueOff val="0"/>
+              <a:satOff val="0"/>
+              <a:lumOff val="0"/>
+              <a:alphaOff val="0"/>
+            </a:schemeClr>
+          </a:solidFill>
+          <a:prstDash val="solid"/>
+        </a:ln>
+        <a:effectLst/>
+      </dsp:spPr>
+      <dsp:style>
+        <a:lnRef idx="2">
+          <a:scrgbClr r="0" g="0" b="0"/>
+        </a:lnRef>
+        <a:fillRef idx="1">
+          <a:scrgbClr r="0" g="0" b="0"/>
+        </a:fillRef>
+        <a:effectRef idx="0">
+          <a:scrgbClr r="0" g="0" b="0"/>
+        </a:effectRef>
+        <a:fontRef idx="minor">
+          <a:schemeClr val="lt1"/>
+        </a:fontRef>
+      </dsp:style>
+      <dsp:txBody>
+        <a:bodyPr spcFirstLastPara="0" vert="horz" wrap="square" lIns="114300" tIns="114300" rIns="114300" bIns="114300" numCol="1" spcCol="1270" anchor="ctr" anchorCtr="0">
+          <a:noAutofit/>
+        </a:bodyPr>
+        <a:lstStyle/>
+        <a:p>
+          <a:pPr marL="0" lvl="0" indent="0" algn="ctr" defTabSz="1333500">
+            <a:lnSpc>
+              <a:spcPct val="90000"/>
+            </a:lnSpc>
+            <a:spcBef>
+              <a:spcPct val="0"/>
+            </a:spcBef>
+            <a:spcAft>
+              <a:spcPct val="35000"/>
+            </a:spcAft>
+            <a:buNone/>
+          </a:pPr>
+          <a:r>
+            <a:rPr lang="en-US" sz="3000" kern="1200" dirty="0"/>
+            <a:t>Create account</a:t>
+          </a:r>
+        </a:p>
+      </dsp:txBody>
+      <dsp:txXfrm>
+        <a:off x="96786" y="1512480"/>
+        <a:ext cx="2439017" cy="1708547"/>
+      </dsp:txXfrm>
+    </dsp:sp>
+    <dsp:sp modelId="{CA56E845-A6C3-4D66-9B1D-6CB595A80B7F}">
+      <dsp:nvSpPr>
+        <dsp:cNvPr id="0" name=""/>
+        <dsp:cNvSpPr/>
+      </dsp:nvSpPr>
+      <dsp:spPr>
+        <a:xfrm>
+          <a:off x="3065544" y="1420052"/>
+          <a:ext cx="2623873" cy="1893403"/>
+        </a:xfrm>
+        <a:prstGeom prst="roundRect">
+          <a:avLst/>
+        </a:prstGeom>
+        <a:solidFill>
+          <a:schemeClr val="accent6">
+            <a:hueOff val="0"/>
+            <a:satOff val="0"/>
+            <a:lumOff val="0"/>
+            <a:alphaOff val="0"/>
+          </a:schemeClr>
+        </a:solidFill>
+        <a:ln w="25400" cap="flat" cmpd="sng" algn="ctr">
+          <a:solidFill>
+            <a:schemeClr val="lt1">
+              <a:hueOff val="0"/>
+              <a:satOff val="0"/>
+              <a:lumOff val="0"/>
+              <a:alphaOff val="0"/>
+            </a:schemeClr>
+          </a:solidFill>
+          <a:prstDash val="solid"/>
+        </a:ln>
+        <a:effectLst/>
+      </dsp:spPr>
+      <dsp:style>
+        <a:lnRef idx="2">
+          <a:scrgbClr r="0" g="0" b="0"/>
+        </a:lnRef>
+        <a:fillRef idx="1">
+          <a:scrgbClr r="0" g="0" b="0"/>
+        </a:fillRef>
+        <a:effectRef idx="0">
+          <a:scrgbClr r="0" g="0" b="0"/>
+        </a:effectRef>
+        <a:fontRef idx="minor">
+          <a:schemeClr val="lt1"/>
+        </a:fontRef>
+      </dsp:style>
+      <dsp:txBody>
+        <a:bodyPr spcFirstLastPara="0" vert="horz" wrap="square" lIns="114300" tIns="114300" rIns="114300" bIns="114300" numCol="1" spcCol="1270" anchor="ctr" anchorCtr="0">
+          <a:noAutofit/>
+        </a:bodyPr>
+        <a:lstStyle/>
+        <a:p>
+          <a:pPr marL="0" lvl="0" indent="0" algn="ctr" defTabSz="1333500">
+            <a:lnSpc>
+              <a:spcPct val="90000"/>
+            </a:lnSpc>
+            <a:spcBef>
+              <a:spcPct val="0"/>
+            </a:spcBef>
+            <a:spcAft>
+              <a:spcPct val="35000"/>
+            </a:spcAft>
+            <a:buNone/>
+          </a:pPr>
+          <a:r>
+            <a:rPr lang="en-US" sz="3000" kern="1200" dirty="0"/>
+            <a:t>Submit code for designated analysis</a:t>
+          </a:r>
+        </a:p>
+      </dsp:txBody>
+      <dsp:txXfrm>
+        <a:off x="3157972" y="1512480"/>
+        <a:ext cx="2439017" cy="1708547"/>
+      </dsp:txXfrm>
+    </dsp:sp>
+    <dsp:sp modelId="{B82B18AA-EF92-4932-B4FB-2F5F1342087F}">
+      <dsp:nvSpPr>
+        <dsp:cNvPr id="0" name=""/>
+        <dsp:cNvSpPr/>
+      </dsp:nvSpPr>
+      <dsp:spPr>
+        <a:xfrm>
+          <a:off x="6157363" y="1395286"/>
+          <a:ext cx="2623873" cy="1893403"/>
+        </a:xfrm>
+        <a:prstGeom prst="roundRect">
+          <a:avLst/>
+        </a:prstGeom>
+        <a:solidFill>
+          <a:schemeClr val="accent6">
+            <a:hueOff val="0"/>
+            <a:satOff val="0"/>
+            <a:lumOff val="0"/>
+            <a:alphaOff val="0"/>
+          </a:schemeClr>
+        </a:solidFill>
+        <a:ln w="25400" cap="flat" cmpd="sng" algn="ctr">
+          <a:solidFill>
+            <a:schemeClr val="lt1">
+              <a:hueOff val="0"/>
+              <a:satOff val="0"/>
+              <a:lumOff val="0"/>
+              <a:alphaOff val="0"/>
+            </a:schemeClr>
+          </a:solidFill>
+          <a:prstDash val="solid"/>
+        </a:ln>
+        <a:effectLst/>
+      </dsp:spPr>
+      <dsp:style>
+        <a:lnRef idx="2">
+          <a:scrgbClr r="0" g="0" b="0"/>
+        </a:lnRef>
+        <a:fillRef idx="1">
+          <a:scrgbClr r="0" g="0" b="0"/>
+        </a:fillRef>
+        <a:effectRef idx="0">
+          <a:scrgbClr r="0" g="0" b="0"/>
+        </a:effectRef>
+        <a:fontRef idx="minor">
+          <a:schemeClr val="lt1"/>
+        </a:fontRef>
+      </dsp:style>
+      <dsp:txBody>
+        <a:bodyPr spcFirstLastPara="0" vert="horz" wrap="square" lIns="114300" tIns="114300" rIns="114300" bIns="114300" numCol="1" spcCol="1270" anchor="ctr" anchorCtr="0">
+          <a:noAutofit/>
+        </a:bodyPr>
+        <a:lstStyle/>
+        <a:p>
+          <a:pPr marL="0" lvl="0" indent="0" algn="ctr" defTabSz="1333500">
+            <a:lnSpc>
+              <a:spcPct val="90000"/>
+            </a:lnSpc>
+            <a:spcBef>
+              <a:spcPct val="0"/>
+            </a:spcBef>
+            <a:spcAft>
+              <a:spcPct val="35000"/>
+            </a:spcAft>
+            <a:buNone/>
+          </a:pPr>
+          <a:r>
+            <a:rPr lang="en-US" sz="3000" kern="1200" dirty="0"/>
+            <a:t>Code runs on validation engine</a:t>
+          </a:r>
+        </a:p>
+      </dsp:txBody>
+      <dsp:txXfrm>
+        <a:off x="6249791" y="1487714"/>
+        <a:ext cx="2439017" cy="1708547"/>
+      </dsp:txXfrm>
+    </dsp:sp>
+    <dsp:sp modelId="{642E9D7F-E2D9-4F7D-9D1D-C774EFC17DE8}">
+      <dsp:nvSpPr>
+        <dsp:cNvPr id="0" name=""/>
+        <dsp:cNvSpPr/>
+      </dsp:nvSpPr>
+      <dsp:spPr>
+        <a:xfrm>
+          <a:off x="9187916" y="1420052"/>
+          <a:ext cx="2623873" cy="1893403"/>
+        </a:xfrm>
+        <a:prstGeom prst="roundRect">
+          <a:avLst/>
+        </a:prstGeom>
+        <a:solidFill>
+          <a:schemeClr val="accent6">
+            <a:hueOff val="0"/>
+            <a:satOff val="0"/>
+            <a:lumOff val="0"/>
+            <a:alphaOff val="0"/>
+          </a:schemeClr>
+        </a:solidFill>
+        <a:ln w="25400" cap="flat" cmpd="sng" algn="ctr">
+          <a:solidFill>
+            <a:schemeClr val="lt1">
+              <a:hueOff val="0"/>
+              <a:satOff val="0"/>
+              <a:lumOff val="0"/>
+              <a:alphaOff val="0"/>
+            </a:schemeClr>
+          </a:solidFill>
+          <a:prstDash val="solid"/>
+        </a:ln>
+        <a:effectLst/>
+      </dsp:spPr>
+      <dsp:style>
+        <a:lnRef idx="2">
+          <a:scrgbClr r="0" g="0" b="0"/>
+        </a:lnRef>
+        <a:fillRef idx="1">
+          <a:scrgbClr r="0" g="0" b="0"/>
+        </a:fillRef>
+        <a:effectRef idx="0">
+          <a:scrgbClr r="0" g="0" b="0"/>
+        </a:effectRef>
+        <a:fontRef idx="minor">
+          <a:schemeClr val="lt1"/>
+        </a:fontRef>
+      </dsp:style>
+      <dsp:txBody>
+        <a:bodyPr spcFirstLastPara="0" vert="horz" wrap="square" lIns="114300" tIns="114300" rIns="114300" bIns="114300" numCol="1" spcCol="1270" anchor="ctr" anchorCtr="0">
+          <a:noAutofit/>
+        </a:bodyPr>
+        <a:lstStyle/>
+        <a:p>
+          <a:pPr marL="0" lvl="0" indent="0" algn="ctr" defTabSz="1333500">
+            <a:lnSpc>
+              <a:spcPct val="90000"/>
+            </a:lnSpc>
+            <a:spcBef>
+              <a:spcPct val="0"/>
+            </a:spcBef>
+            <a:spcAft>
+              <a:spcPct val="35000"/>
+            </a:spcAft>
+            <a:buNone/>
+          </a:pPr>
+          <a:r>
+            <a:rPr lang="en-US" sz="3000" kern="1200" dirty="0"/>
+            <a:t>Leaderboard updated</a:t>
+          </a:r>
+        </a:p>
+      </dsp:txBody>
+      <dsp:txXfrm>
+        <a:off x="9280344" y="1512480"/>
+        <a:ext cx="2439017" cy="1708547"/>
+      </dsp:txXfrm>
+    </dsp:sp>
+    <dsp:sp modelId="{2DE841E0-E6A1-4356-850D-7AD0D2D4040E}">
+      <dsp:nvSpPr>
+        <dsp:cNvPr id="0" name=""/>
+        <dsp:cNvSpPr/>
+      </dsp:nvSpPr>
+      <dsp:spPr>
+        <a:xfrm>
+          <a:off x="12249101" y="1420052"/>
+          <a:ext cx="2623873" cy="1893403"/>
+        </a:xfrm>
+        <a:prstGeom prst="roundRect">
+          <a:avLst/>
+        </a:prstGeom>
+        <a:solidFill>
+          <a:schemeClr val="accent6">
+            <a:hueOff val="0"/>
+            <a:satOff val="0"/>
+            <a:lumOff val="0"/>
+            <a:alphaOff val="0"/>
+          </a:schemeClr>
+        </a:solidFill>
+        <a:ln w="25400" cap="flat" cmpd="sng" algn="ctr">
+          <a:solidFill>
+            <a:schemeClr val="lt1">
+              <a:hueOff val="0"/>
+              <a:satOff val="0"/>
+              <a:lumOff val="0"/>
+              <a:alphaOff val="0"/>
+            </a:schemeClr>
+          </a:solidFill>
+          <a:prstDash val="solid"/>
+        </a:ln>
+        <a:effectLst/>
+      </dsp:spPr>
+      <dsp:style>
+        <a:lnRef idx="2">
+          <a:scrgbClr r="0" g="0" b="0"/>
+        </a:lnRef>
+        <a:fillRef idx="1">
+          <a:scrgbClr r="0" g="0" b="0"/>
+        </a:fillRef>
+        <a:effectRef idx="0">
+          <a:scrgbClr r="0" g="0" b="0"/>
+        </a:effectRef>
+        <a:fontRef idx="minor">
+          <a:schemeClr val="lt1"/>
+        </a:fontRef>
+      </dsp:style>
+      <dsp:txBody>
+        <a:bodyPr spcFirstLastPara="0" vert="horz" wrap="square" lIns="114300" tIns="114300" rIns="114300" bIns="114300" numCol="1" spcCol="1270" anchor="ctr" anchorCtr="0">
+          <a:noAutofit/>
+        </a:bodyPr>
+        <a:lstStyle/>
+        <a:p>
+          <a:pPr marL="0" lvl="0" indent="0" algn="ctr" defTabSz="1333500">
+            <a:lnSpc>
+              <a:spcPct val="90000"/>
+            </a:lnSpc>
+            <a:spcBef>
+              <a:spcPct val="0"/>
+            </a:spcBef>
+            <a:spcAft>
+              <a:spcPct val="35000"/>
+            </a:spcAft>
+            <a:buNone/>
+          </a:pPr>
+          <a:r>
+            <a:rPr lang="en-US" sz="3000" kern="1200" dirty="0"/>
+            <a:t>Private report sent to developer</a:t>
+          </a:r>
+        </a:p>
+      </dsp:txBody>
+      <dsp:txXfrm>
+        <a:off x="12341529" y="1512480"/>
+        <a:ext cx="2439017" cy="1708547"/>
+      </dsp:txXfrm>
+    </dsp:sp>
+  </dsp:spTree>
+</dsp:drawing>
+</file>
+
+<file path=ppt/diagrams/layout1.xml><?xml version="1.0" encoding="utf-8"?>
+<dgm:layoutDef xmlns:dgm="http://schemas.openxmlformats.org/drawingml/2006/diagram" xmlns:a="http://schemas.openxmlformats.org/drawingml/2006/main" uniqueId="urn:microsoft.com/office/officeart/2005/8/layout/hProcess9">
+  <dgm:title val=""/>
+  <dgm:desc val=""/>
+  <dgm:catLst>
+    <dgm:cat type="process" pri="5000"/>
+    <dgm:cat type="convert" pri="13000"/>
+  </dgm:catLst>
+  <dgm:sampData useDef="1">
+    <dgm:dataModel>
+      <dgm:ptLst/>
+      <dgm:bg/>
+      <dgm:whole/>
+    </dgm:dataModel>
+  </dgm:sampData>
+  <dgm:styleData>
+    <dgm:dataModel>
+      <dgm:ptLst>
+        <dgm:pt modelId="0" type="doc"/>
+        <dgm:pt modelId="1"/>
+        <dgm:pt modelId="2"/>
+      </dgm:ptLst>
+      <dgm:cxnLst>
+        <dgm:cxn modelId="3" srcId="0" destId="1" srcOrd="0" destOrd="0"/>
+        <dgm:cxn modelId="4" srcId="0" destId="2" srcOrd="1" destOrd="0"/>
+      </dgm:cxnLst>
+      <dgm:bg/>
+      <dgm:whole/>
+    </dgm:dataModel>
+  </dgm:styleData>
+  <dgm:clrData>
+    <dgm:dataModel>
+      <dgm:ptLst>
+        <dgm:pt modelId="0" type="doc"/>
+        <dgm:pt modelId="1"/>
+        <dgm:pt modelId="2"/>
+        <dgm:pt modelId="3"/>
+        <dgm:pt modelId="4"/>
+      </dgm:ptLst>
+      <dgm:cxnLst>
+        <dgm:cxn modelId="5" srcId="0" destId="1" srcOrd="0" destOrd="0"/>
+        <dgm:cxn modelId="6" srcId="0" destId="2" srcOrd="1" destOrd="0"/>
+        <dgm:cxn modelId="7" srcId="0" destId="3" srcOrd="2" destOrd="0"/>
+        <dgm:cxn modelId="8" srcId="0" destId="4" srcOrd="3" destOrd="0"/>
+      </dgm:cxnLst>
+      <dgm:bg/>
+      <dgm:whole/>
+    </dgm:dataModel>
+  </dgm:clrData>
+  <dgm:layoutNode name="CompostProcess">
+    <dgm:varLst>
+      <dgm:dir/>
+      <dgm:resizeHandles val="exact"/>
+    </dgm:varLst>
+    <dgm:alg type="composite">
+      <dgm:param type="horzAlign" val="ctr"/>
+      <dgm:param type="vertAlign" val="mid"/>
+    </dgm:alg>
+    <dgm:shape xmlns:r="http://schemas.openxmlformats.org/officeDocument/2006/relationships" r:blip="">
+      <dgm:adjLst/>
+    </dgm:shape>
+    <dgm:presOf/>
+    <dgm:constrLst>
+      <dgm:constr type="w" for="ch" forName="arrow" refType="w" fact="0.85"/>
+      <dgm:constr type="h" for="ch" forName="arrow" refType="h"/>
+      <dgm:constr type="ctrX" for="ch" forName="arrow" refType="w" fact="0.5"/>
+      <dgm:constr type="ctrY" for="ch" forName="arrow" refType="h" fact="0.5"/>
+      <dgm:constr type="w" for="ch" forName="linearProcess" refType="w"/>
+      <dgm:constr type="h" for="ch" forName="linearProcess" refType="h" fact="0.4"/>
+      <dgm:constr type="ctrX" for="ch" forName="linearProcess" refType="w" fact="0.5"/>
+      <dgm:constr type="ctrY" for="ch" forName="linearProcess" refType="h" fact="0.5"/>
+    </dgm:constrLst>
+    <dgm:ruleLst/>
+    <dgm:layoutNode name="arrow" styleLbl="bgShp">
+      <dgm:alg type="sp"/>
+      <dgm:choose name="Name0">
+        <dgm:if name="Name1" func="var" arg="dir" op="equ" val="norm">
+          <dgm:shape xmlns:r="http://schemas.openxmlformats.org/officeDocument/2006/relationships" type="rightArrow" r:blip="">
+            <dgm:adjLst/>
+          </dgm:shape>
+        </dgm:if>
+        <dgm:else name="Name2">
+          <dgm:shape xmlns:r="http://schemas.openxmlformats.org/officeDocument/2006/relationships" type="leftArrow" r:blip="">
+            <dgm:adjLst/>
+          </dgm:shape>
+        </dgm:else>
+      </dgm:choose>
+      <dgm:presOf/>
+      <dgm:constrLst/>
+      <dgm:ruleLst/>
+    </dgm:layoutNode>
+    <dgm:layoutNode name="linearProcess">
+      <dgm:choose name="Name3">
+        <dgm:if name="Name4" func="var" arg="dir" op="equ" val="norm">
+          <dgm:alg type="lin"/>
+        </dgm:if>
+        <dgm:else name="Name5">
+          <dgm:alg type="lin">
+            <dgm:param type="linDir" val="fromR"/>
+          </dgm:alg>
+        </dgm:else>
+      </dgm:choose>
+      <dgm:shape xmlns:r="http://schemas.openxmlformats.org/officeDocument/2006/relationships" r:blip="">
+        <dgm:adjLst/>
+      </dgm:shape>
+      <dgm:presOf/>
+      <dgm:constrLst>
+        <dgm:constr type="userA" for="ch" ptType="node" refType="w"/>
+        <dgm:constr type="h" for="ch" ptType="node" refType="h"/>
+        <dgm:constr type="w" for="ch" ptType="node" op="equ"/>
+        <dgm:constr type="w" for="ch" forName="sibTrans" refType="w" fact="0.05"/>
+        <dgm:constr type="primFontSz" for="ch" ptType="node" op="equ" val="65"/>
+      </dgm:constrLst>
+      <dgm:ruleLst/>
+      <dgm:forEach name="Name6" axis="ch" ptType="node">
+        <dgm:layoutNode name="textNode" styleLbl="node1">
+          <dgm:varLst>
+            <dgm:bulletEnabled val="1"/>
+          </dgm:varLst>
+          <dgm:alg type="tx"/>
+          <dgm:shape xmlns:r="http://schemas.openxmlformats.org/officeDocument/2006/relationships" type="roundRect" r:blip="">
+            <dgm:adjLst/>
+          </dgm:shape>
+          <dgm:presOf axis="desOrSelf" ptType="node"/>
+          <dgm:constrLst>
+            <dgm:constr type="userA"/>
+            <dgm:constr type="w" refType="userA" fact="0.3"/>
+            <dgm:constr type="tMarg" refType="primFontSz" fact="0.3"/>
+            <dgm:constr type="bMarg" refType="primFontSz" fact="0.3"/>
+            <dgm:constr type="lMarg" refType="primFontSz" fact="0.3"/>
+            <dgm:constr type="rMarg" refType="primFontSz" fact="0.3"/>
+          </dgm:constrLst>
+          <dgm:ruleLst>
+            <dgm:rule type="w" val="NaN" fact="1" max="NaN"/>
+            <dgm:rule type="primFontSz" val="5" fact="NaN" max="NaN"/>
+          </dgm:ruleLst>
+        </dgm:layoutNode>
+        <dgm:forEach name="Name7" axis="followSib" ptType="sibTrans" cnt="1">
+          <dgm:layoutNode name="sibTrans">
+            <dgm:alg type="sp"/>
+            <dgm:shape xmlns:r="http://schemas.openxmlformats.org/officeDocument/2006/relationships" r:blip="">
+              <dgm:adjLst/>
+            </dgm:shape>
+            <dgm:presOf/>
+            <dgm:constrLst/>
+            <dgm:ruleLst/>
+          </dgm:layoutNode>
+        </dgm:forEach>
+      </dgm:forEach>
+    </dgm:layoutNode>
+  </dgm:layoutNode>
+</dgm:layoutDef>
+</file>
+
+<file path=ppt/diagrams/quickStyle1.xml><?xml version="1.0" encoding="utf-8"?>
+<dgm:styleDef xmlns:dgm="http://schemas.openxmlformats.org/drawingml/2006/diagram" xmlns:a="http://schemas.openxmlformats.org/drawingml/2006/main" uniqueId="urn:microsoft.com/office/officeart/2005/8/quickstyle/simple1">
+  <dgm:title val=""/>
+  <dgm:desc val=""/>
+  <dgm:catLst>
+    <dgm:cat type="simple" pri="10100"/>
+  </dgm:catLst>
+  <dgm:scene3d>
+    <a:camera prst="orthographicFront"/>
+    <a:lightRig rig="threePt" dir="t"/>
+  </dgm:scene3d>
+  <dgm:styleLbl name="node0">
+    <dgm:scene3d>
+      <a:camera prst="orthographicFront"/>
+      <a:lightRig rig="threePt" dir="t"/>
+    </dgm:scene3d>
+    <dgm:sp3d/>
+    <dgm:txPr/>
+    <dgm:style>
+      <a:lnRef idx="2">
+        <a:scrgbClr r="0" g="0" b="0"/>
+      </a:lnRef>
+      <a:fillRef idx="1">
+        <a:scrgbClr r="0" g="0" b="0"/>
+      </a:fillRef>
+      <a:effectRef idx="0">
+        <a:scrgbClr r="0" g="0" b="0"/>
+      </a:effectRef>
+      <a:fontRef idx="minor">
+        <a:schemeClr val="lt1"/>
+      </a:fontRef>
+    </dgm:style>
+  </dgm:styleLbl>
+  <dgm:styleLbl name="lnNode1">
+    <dgm:scene3d>
+      <a:camera prst="orthographicFront"/>
+      <a:lightRig rig="threePt" dir="t"/>
+    </dgm:scene3d>
+    <dgm:sp3d/>
+    <dgm:txPr/>
+    <dgm:style>
+      <a:lnRef idx="2">
+        <a:scrgbClr r="0" g="0" b="0"/>
+      </a:lnRef>
+      <a:fillRef idx="1">
+        <a:scrgbClr r="0" g="0" b="0"/>
+      </a:fillRef>
+      <a:effectRef idx="0">
+        <a:scrgbClr r="0" g="0" b="0"/>
+      </a:effectRef>
+      <a:fontRef idx="minor">
+        <a:schemeClr val="lt1"/>
+      </a:fontRef>
+    </dgm:style>
+  </dgm:styleLbl>
+  <dgm:styleLbl name="vennNode1">
+    <dgm:scene3d>
+      <a:camera prst="orthographicFront"/>
+      <a:lightRig rig="threePt" dir="t"/>
+    </dgm:scene3d>
+    <dgm:sp3d/>
+    <dgm:txPr/>
+    <dgm:style>
+      <a:lnRef idx="2">
+        <a:scrgbClr r="0" g="0" b="0"/>
+      </a:lnRef>
+      <a:fillRef idx="1">
+        <a:scrgbClr r="0" g="0" b="0"/>
+      </a:fillRef>
+      <a:effectRef idx="0">
+        <a:scrgbClr r="0" g="0" b="0"/>
+      </a:effectRef>
+      <a:fontRef idx="minor">
+        <a:schemeClr val="tx1"/>
+      </a:fontRef>
+    </dgm:style>
+  </dgm:styleLbl>
+  <dgm:styleLbl name="alignNode1">
+    <dgm:scene3d>
+      <a:camera prst="orthographicFront"/>
+      <a:lightRig rig="threePt" dir="t"/>
+    </dgm:scene3d>
+    <dgm:sp3d/>
+    <dgm:txPr/>
+    <dgm:style>
+      <a:lnRef idx="2">
+        <a:scrgbClr r="0" g="0" b="0"/>
+      </a:lnRef>
+      <a:fillRef idx="1">
+        <a:scrgbClr r="0" g="0" b="0"/>
+      </a:fillRef>
+      <a:effectRef idx="0">
+        <a:scrgbClr r="0" g="0" b="0"/>
+      </a:effectRef>
+      <a:fontRef idx="minor">
+        <a:schemeClr val="lt1"/>
+      </a:fontRef>
+    </dgm:style>
+  </dgm:styleLbl>
+  <dgm:styleLbl name="node1">
+    <dgm:scene3d>
+      <a:camera prst="orthographicFront"/>
+      <a:lightRig rig="threePt" dir="t"/>
+    </dgm:scene3d>
+    <dgm:sp3d/>
+    <dgm:txPr/>
+    <dgm:style>
+      <a:lnRef idx="2">
+        <a:scrgbClr r="0" g="0" b="0"/>
+      </a:lnRef>
+      <a:fillRef idx="1">
+        <a:scrgbClr r="0" g="0" b="0"/>
+      </a:fillRef>
+      <a:effectRef idx="0">
+        <a:scrgbClr r="0" g="0" b="0"/>
+      </a:effectRef>
+      <a:fontRef idx="minor">
+        <a:schemeClr val="lt1"/>
+      </a:fontRef>
+    </dgm:style>
+  </dgm:styleLbl>
+  <dgm:styleLbl name="node2">
+    <dgm:scene3d>
+      <a:camera prst="orthographicFront"/>
+      <a:lightRig rig="threePt" dir="t"/>
+    </dgm:scene3d>
+    <dgm:sp3d/>
+    <dgm:txPr/>
+    <dgm:style>
+      <a:lnRef idx="2">
+        <a:scrgbClr r="0" g="0" b="0"/>
+      </a:lnRef>
+      <a:fillRef idx="1">
+        <a:scrgbClr r="0" g="0" b="0"/>
+      </a:fillRef>
+      <a:effectRef idx="0">
+        <a:scrgbClr r="0" g="0" b="0"/>
+      </a:effectRef>
+      <a:fontRef idx="minor">
+        <a:schemeClr val="lt1"/>
+      </a:fontRef>
+    </dgm:style>
+  </dgm:styleLbl>
+  <dgm:styleLbl name="node3">
+    <dgm:scene3d>
+      <a:camera prst="orthographicFront"/>
+      <a:lightRig rig="threePt" dir="t"/>
+    </dgm:scene3d>
+    <dgm:sp3d/>
+    <dgm:txPr/>
+    <dgm:style>
+      <a:lnRef idx="2">
+        <a:scrgbClr r="0" g="0" b="0"/>
+      </a:lnRef>
+      <a:fillRef idx="1">
+        <a:scrgbClr r="0" g="0" b="0"/>
+      </a:fillRef>
+      <a:effectRef idx="0">
+        <a:scrgbClr r="0" g="0" b="0"/>
+      </a:effectRef>
+      <a:fontRef idx="minor">
+        <a:schemeClr val="lt1"/>
+      </a:fontRef>
+    </dgm:style>
+  </dgm:styleLbl>
+  <dgm:styleLbl name="node4">
+    <dgm:scene3d>
+      <a:camera prst="orthographicFront"/>
+      <a:lightRig rig="threePt" dir="t"/>
+    </dgm:scene3d>
+    <dgm:sp3d/>
+    <dgm:txPr/>
+    <dgm:style>
+      <a:lnRef idx="2">
+        <a:scrgbClr r="0" g="0" b="0"/>
+      </a:lnRef>
+      <a:fillRef idx="1">
+        <a:scrgbClr r="0" g="0" b="0"/>
+      </a:fillRef>
+      <a:effectRef idx="0">
+        <a:scrgbClr r="0" g="0" b="0"/>
+      </a:effectRef>
+      <a:fontRef idx="minor">
+        <a:schemeClr val="lt1"/>
+      </a:fontRef>
+    </dgm:style>
+  </dgm:styleLbl>
+  <dgm:styleLbl name="fgImgPlace1">
+    <dgm:scene3d>
+      <a:camera prst="orthographicFront"/>
+      <a:lightRig rig="threePt" dir="t"/>
+    </dgm:scene3d>
+    <dgm:sp3d/>
+    <dgm:txPr/>
+    <dgm:style>
+      <a:lnRef idx="2">
+        <a:scrgbClr r="0" g="0" b="0"/>
+      </a:lnRef>
+      <a:fillRef idx="1">
+        <a:scrgbClr r="0" g="0" b="0"/>
+      </a:fillRef>
+      <a:effectRef idx="0">
+        <a:scrgbClr r="0" g="0" b="0"/>
+      </a:effectRef>
+      <a:fontRef idx="minor"/>
+    </dgm:style>
+  </dgm:styleLbl>
+  <dgm:styleLbl name="alignImgPlace1">
+    <dgm:scene3d>
+      <a:camera prst="orthographicFront"/>
+      <a:lightRig rig="threePt" dir="t"/>
+    </dgm:scene3d>
+    <dgm:sp3d/>
+    <dgm:txPr/>
+    <dgm:style>
+      <a:lnRef idx="2">
+        <a:scrgbClr r="0" g="0" b="0"/>
+      </a:lnRef>
+      <a:fillRef idx="1">
+        <a:scrgbClr r="0" g="0" b="0"/>
+      </a:fillRef>
+      <a:effectRef idx="0">
+        <a:scrgbClr r="0" g="0" b="0"/>
+      </a:effectRef>
+      <a:fontRef idx="minor"/>
+    </dgm:style>
+  </dgm:styleLbl>
+  <dgm:styleLbl name="bgImgPlace1">
+    <dgm:scene3d>
+      <a:camera prst="orthographicFront"/>
+      <a:lightRig rig="threePt" dir="t"/>
+    </dgm:scene3d>
+    <dgm:sp3d/>
+    <dgm:txPr/>
+    <dgm:style>
+      <a:lnRef idx="2">
+        <a:scrgbClr r="0" g="0" b="0"/>
+      </a:lnRef>
+      <a:fillRef idx="1">
+        <a:scrgbClr r="0" g="0" b="0"/>
+      </a:fillRef>
+      <a:effectRef idx="0">
+        <a:scrgbClr r="0" g="0" b="0"/>
+      </a:effectRef>
+      <a:fontRef idx="minor"/>
+    </dgm:style>
+  </dgm:styleLbl>
+  <dgm:styleLbl name="sibTrans2D1">
+    <dgm:scene3d>
+      <a:camera prst="orthographicFront"/>
+      <a:lightRig rig="threePt" dir="t"/>
+    </dgm:scene3d>
+    <dgm:sp3d/>
+    <dgm:txPr/>
+    <dgm:style>
+      <a:lnRef idx="0">
+        <a:scrgbClr r="0" g="0" b="0"/>
+      </a:lnRef>
+      <a:fillRef idx="1">
+        <a:scrgbClr r="0" g="0" b="0"/>
+      </a:fillRef>
+      <a:effectRef idx="0">
+        <a:scrgbClr r="0" g="0" b="0"/>
+      </a:effectRef>
+      <a:fontRef idx="minor">
+        <a:schemeClr val="lt1"/>
+      </a:fontRef>
+    </dgm:style>
+  </dgm:styleLbl>
+  <dgm:styleLbl name="fgSibTrans2D1">
+    <dgm:scene3d>
+      <a:camera prst="orthographicFront"/>
+      <a:lightRig rig="threePt" dir="t"/>
+    </dgm:scene3d>
+    <dgm:sp3d/>
+    <dgm:txPr/>
+    <dgm:style>
+      <a:lnRef idx="0">
+        <a:scrgbClr r="0" g="0" b="0"/>
+      </a:lnRef>
+      <a:fillRef idx="1">
+        <a:scrgbClr r="0" g="0" b="0"/>
+      </a:fillRef>
+      <a:effectRef idx="0">
+        <a:scrgbClr r="0" g="0" b="0"/>
+      </a:effectRef>
+      <a:fontRef idx="minor">
+        <a:schemeClr val="lt1"/>
+      </a:fontRef>
+    </dgm:style>
+  </dgm:styleLbl>
+  <dgm:styleLbl name="bgSibTrans2D1">
+    <dgm:scene3d>
+      <a:camera prst="orthographicFront"/>
+      <a:lightRig rig="threePt" dir="t"/>
+    </dgm:scene3d>
+    <dgm:sp3d/>
+    <dgm:txPr/>
+    <dgm:style>
+      <a:lnRef idx="0">
+        <a:scrgbClr r="0" g="0" b="0"/>
+      </a:lnRef>
+      <a:fillRef idx="1">
+        <a:scrgbClr r="0" g="0" b="0"/>
+      </a:fillRef>
+      <a:effectRef idx="0">
+        <a:scrgbClr r="0" g="0" b="0"/>
+      </a:effectRef>
+      <a:fontRef idx="minor">
+        <a:schemeClr val="lt1"/>
+      </a:fontRef>
+    </dgm:style>
+  </dgm:styleLbl>
+  <dgm:styleLbl name="sibTrans1D1">
+    <dgm:scene3d>
+      <a:camera prst="orthographicFront"/>
+      <a:lightRig rig="threePt" dir="t"/>
+    </dgm:scene3d>
+    <dgm:sp3d/>
+    <dgm:txPr/>
+    <dgm:style>
+      <a:lnRef idx="1">
+        <a:scrgbClr r="0" g="0" b="0"/>
+      </a:lnRef>
+      <a:fillRef idx="0">
+        <a:scrgbClr r="0" g="0" b="0"/>
+      </a:fillRef>
+      <a:effectRef idx="0">
+        <a:scrgbClr r="0" g="0" b="0"/>
+      </a:effectRef>
+      <a:fontRef idx="minor"/>
+    </dgm:style>
+  </dgm:styleLbl>
+  <dgm:styleLbl name="callout">
+    <dgm:scene3d>
+      <a:camera prst="orthographicFront"/>
+      <a:lightRig rig="threePt" dir="t"/>
+    </dgm:scene3d>
+    <dgm:sp3d/>
+    <dgm:txPr/>
+    <dgm:style>
+      <a:lnRef idx="2">
+        <a:scrgbClr r="0" g="0" b="0"/>
+      </a:lnRef>
+      <a:fillRef idx="1">
+        <a:scrgbClr r="0" g="0" b="0"/>
+      </a:fillRef>
+      <a:effectRef idx="0">
+        <a:scrgbClr r="0" g="0" b="0"/>
+      </a:effectRef>
+      <a:fontRef idx="minor"/>
+    </dgm:style>
+  </dgm:styleLbl>
+  <dgm:styleLbl name="asst0">
+    <dgm:scene3d>
+      <a:camera prst="orthographicFront"/>
+      <a:lightRig rig="threePt" dir="t"/>
+    </dgm:scene3d>
+    <dgm:sp3d/>
+    <dgm:txPr/>
+    <dgm:style>
+      <a:lnRef idx="2">
+        <a:scrgbClr r="0" g="0" b="0"/>
+      </a:lnRef>
+      <a:fillRef idx="1">
+        <a:scrgbClr r="0" g="0" b="0"/>
+      </a:fillRef>
+      <a:effectRef idx="0">
+        <a:scrgbClr r="0" g="0" b="0"/>
+      </a:effectRef>
+      <a:fontRef idx="minor">
+        <a:schemeClr val="lt1"/>
+      </a:fontRef>
+    </dgm:style>
+  </dgm:styleLbl>
+  <dgm:styleLbl name="asst1">
+    <dgm:scene3d>
+      <a:camera prst="orthographicFront"/>
+      <a:lightRig rig="threePt" dir="t"/>
+    </dgm:scene3d>
+    <dgm:sp3d/>
+    <dgm:txPr/>
+    <dgm:style>
+      <a:lnRef idx="2">
+        <a:scrgbClr r="0" g="0" b="0"/>
+      </a:lnRef>
+      <a:fillRef idx="1">
+        <a:scrgbClr r="0" g="0" b="0"/>
+      </a:fillRef>
+      <a:effectRef idx="0">
+        <a:scrgbClr r="0" g="0" b="0"/>
+      </a:effectRef>
+      <a:fontRef idx="minor">
+        <a:schemeClr val="lt1"/>
+      </a:fontRef>
+    </dgm:style>
+  </dgm:styleLbl>
+  <dgm:styleLbl name="asst2">
+    <dgm:scene3d>
+      <a:camera prst="orthographicFront"/>
+      <a:lightRig rig="threePt" dir="t"/>
+    </dgm:scene3d>
+    <dgm:sp3d/>
+    <dgm:txPr/>
+    <dgm:style>
+      <a:lnRef idx="2">
+        <a:scrgbClr r="0" g="0" b="0"/>
+      </a:lnRef>
+      <a:fillRef idx="1">
+        <a:scrgbClr r="0" g="0" b="0"/>
+      </a:fillRef>
+      <a:effectRef idx="0">
+        <a:scrgbClr r="0" g="0" b="0"/>
+      </a:effectRef>
+      <a:fontRef idx="minor">
+        <a:schemeClr val="lt1"/>
+      </a:fontRef>
+    </dgm:style>
+  </dgm:styleLbl>
+  <dgm:styleLbl name="asst3">
+    <dgm:scene3d>
+      <a:camera prst="orthographicFront"/>
+      <a:lightRig rig="threePt" dir="t"/>
+    </dgm:scene3d>
+    <dgm:sp3d/>
+    <dgm:txPr/>
+    <dgm:style>
+      <a:lnRef idx="2">
+        <a:scrgbClr r="0" g="0" b="0"/>
+      </a:lnRef>
+      <a:fillRef idx="1">
+        <a:scrgbClr r="0" g="0" b="0"/>
+      </a:fillRef>
+      <a:effectRef idx="0">
+        <a:scrgbClr r="0" g="0" b="0"/>
+      </a:effectRef>
+      <a:fontRef idx="minor">
+        <a:schemeClr val="lt1"/>
+      </a:fontRef>
+    </dgm:style>
+  </dgm:styleLbl>
+  <dgm:styleLbl name="asst4">
+    <dgm:scene3d>
+      <a:camera prst="orthographicFront"/>
+      <a:lightRig rig="threePt" dir="t"/>
+    </dgm:scene3d>
+    <dgm:sp3d/>
+    <dgm:txPr/>
+    <dgm:style>
+      <a:lnRef idx="2">
+        <a:scrgbClr r="0" g="0" b="0"/>
+      </a:lnRef>
+      <a:fillRef idx="1">
+        <a:scrgbClr r="0" g="0" b="0"/>
+      </a:fillRef>
+      <a:effectRef idx="0">
+        <a:scrgbClr r="0" g="0" b="0"/>
+      </a:effectRef>
+      <a:fontRef idx="minor">
+        <a:schemeClr val="lt1"/>
+      </a:fontRef>
+    </dgm:style>
+  </dgm:styleLbl>
+  <dgm:styleLbl name="parChTrans2D1">
+    <dgm:scene3d>
+      <a:camera prst="orthographicFront"/>
+      <a:lightRig rig="threePt" dir="t"/>
+    </dgm:scene3d>
+    <dgm:sp3d/>
+    <dgm:txPr/>
+    <dgm:style>
+      <a:lnRef idx="2">
+        <a:scrgbClr r="0" g="0" b="0"/>
+      </a:lnRef>
+      <a:fillRef idx="1">
+        <a:scrgbClr r="0" g="0" b="0"/>
+      </a:fillRef>
+      <a:effectRef idx="0">
+        <a:scrgbClr r="0" g="0" b="0"/>
+      </a:effectRef>
+      <a:fontRef idx="minor">
+        <a:schemeClr val="lt1"/>
+      </a:fontRef>
+    </dgm:style>
+  </dgm:styleLbl>
+  <dgm:styleLbl name="parChTrans2D2">
+    <dgm:scene3d>
+      <a:camera prst="orthographicFront"/>
+      <a:lightRig rig="threePt" dir="t"/>
+    </dgm:scene3d>
+    <dgm:sp3d/>
+    <dgm:txPr/>
+    <dgm:style>
+      <a:lnRef idx="2">
+        <a:scrgbClr r="0" g="0" b="0"/>
+      </a:lnRef>
+      <a:fillRef idx="1">
+        <a:scrgbClr r="0" g="0" b="0"/>
+      </a:fillRef>
+      <a:effectRef idx="0">
+        <a:scrgbClr r="0" g="0" b="0"/>
+      </a:effectRef>
+      <a:fontRef idx="minor">
+        <a:schemeClr val="lt1"/>
+      </a:fontRef>
+    </dgm:style>
+  </dgm:styleLbl>
+  <dgm:styleLbl name="parChTrans2D3">
+    <dgm:scene3d>
+      <a:camera prst="orthographicFront"/>
+      <a:lightRig rig="threePt" dir="t"/>
+    </dgm:scene3d>
+    <dgm:sp3d/>
+    <dgm:txPr/>
+    <dgm:style>
+      <a:lnRef idx="2">
+        <a:scrgbClr r="0" g="0" b="0"/>
+      </a:lnRef>
+      <a:fillRef idx="1">
+        <a:scrgbClr r="0" g="0" b="0"/>
+      </a:fillRef>
+      <a:effectRef idx="0">
+        <a:scrgbClr r="0" g="0" b="0"/>
+      </a:effectRef>
+      <a:fontRef idx="minor">
+        <a:schemeClr val="lt1"/>
+      </a:fontRef>
+    </dgm:style>
+  </dgm:styleLbl>
+  <dgm:styleLbl name="parChTrans2D4">
+    <dgm:scene3d>
+      <a:camera prst="orthographicFront"/>
+      <a:lightRig rig="threePt" dir="t"/>
+    </dgm:scene3d>
+    <dgm:sp3d/>
+    <dgm:txPr/>
+    <dgm:style>
+      <a:lnRef idx="2">
+        <a:scrgbClr r="0" g="0" b="0"/>
+      </a:lnRef>
+      <a:fillRef idx="1">
+        <a:scrgbClr r="0" g="0" b="0"/>
+      </a:fillRef>
+      <a:effectRef idx="0">
+        <a:scrgbClr r="0" g="0" b="0"/>
+      </a:effectRef>
+      <a:fontRef idx="minor">
+        <a:schemeClr val="lt1"/>
+      </a:fontRef>
+    </dgm:style>
+  </dgm:styleLbl>
+  <dgm:styleLbl name="parChTrans1D1">
+    <dgm:scene3d>
+      <a:camera prst="orthographicFront"/>
+      <a:lightRig rig="threePt" dir="t"/>
+    </dgm:scene3d>
+    <dgm:sp3d/>
+    <dgm:txPr/>
+    <dgm:style>
+      <a:lnRef idx="2">
+        <a:scrgbClr r="0" g="0" b="0"/>
+      </a:lnRef>
+      <a:fillRef idx="0">
+        <a:scrgbClr r="0" g="0" b="0"/>
+      </a:fillRef>
+      <a:effectRef idx="0">
+        <a:scrgbClr r="0" g="0" b="0"/>
+      </a:effectRef>
+      <a:fontRef idx="minor"/>
+    </dgm:style>
+  </dgm:styleLbl>
+  <dgm:styleLbl name="parChTrans1D2">
+    <dgm:scene3d>
+      <a:camera prst="orthographicFront"/>
+      <a:lightRig rig="threePt" dir="t"/>
+    </dgm:scene3d>
+    <dgm:sp3d/>
+    <dgm:txPr/>
+    <dgm:style>
+      <a:lnRef idx="2">
+        <a:scrgbClr r="0" g="0" b="0"/>
+      </a:lnRef>
+      <a:fillRef idx="0">
+        <a:scrgbClr r="0" g="0" b="0"/>
+      </a:fillRef>
+      <a:effectRef idx="0">
+        <a:scrgbClr r="0" g="0" b="0"/>
+      </a:effectRef>
+      <a:fontRef idx="minor"/>
+    </dgm:style>
+  </dgm:styleLbl>
+  <dgm:styleLbl name="parChTrans1D3">
+    <dgm:scene3d>
+      <a:camera prst="orthographicFront"/>
+      <a:lightRig rig="threePt" dir="t"/>
+    </dgm:scene3d>
+    <dgm:sp3d/>
+    <dgm:txPr/>
+    <dgm:style>
+      <a:lnRef idx="2">
+        <a:scrgbClr r="0" g="0" b="0"/>
+      </a:lnRef>
+      <a:fillRef idx="0">
+        <a:scrgbClr r="0" g="0" b="0"/>
+      </a:fillRef>
+      <a:effectRef idx="0">
+        <a:scrgbClr r="0" g="0" b="0"/>
+      </a:effectRef>
+      <a:fontRef idx="minor"/>
+    </dgm:style>
+  </dgm:styleLbl>
+  <dgm:styleLbl name="parChTrans1D4">
+    <dgm:scene3d>
+      <a:camera prst="orthographicFront"/>
+      <a:lightRig rig="threePt" dir="t"/>
+    </dgm:scene3d>
+    <dgm:sp3d/>
+    <dgm:txPr/>
+    <dgm:style>
+      <a:lnRef idx="2">
+        <a:scrgbClr r="0" g="0" b="0"/>
+      </a:lnRef>
+      <a:fillRef idx="0">
+        <a:scrgbClr r="0" g="0" b="0"/>
+      </a:fillRef>
+      <a:effectRef idx="0">
+        <a:scrgbClr r="0" g="0" b="0"/>
+      </a:effectRef>
+      <a:fontRef idx="minor"/>
+    </dgm:style>
+  </dgm:styleLbl>
+  <dgm:styleLbl name="fgAcc1">
+    <dgm:scene3d>
+      <a:camera prst="orthographicFront"/>
+      <a:lightRig rig="threePt" dir="t"/>
+    </dgm:scene3d>
+    <dgm:sp3d/>
+    <dgm:txPr/>
+    <dgm:style>
+      <a:lnRef idx="2">
+        <a:scrgbClr r="0" g="0" b="0"/>
+      </a:lnRef>
+      <a:fillRef idx="1">
+        <a:scrgbClr r="0" g="0" b="0"/>
+      </a:fillRef>
+      <a:effectRef idx="0">
+        <a:scrgbClr r="0" g="0" b="0"/>
+      </a:effectRef>
+      <a:fontRef idx="minor"/>
+    </dgm:style>
+  </dgm:styleLbl>
+  <dgm:styleLbl name="conFgAcc1">
+    <dgm:scene3d>
+      <a:camera prst="orthographicFront"/>
+      <a:lightRig rig="threePt" dir="t"/>
+    </dgm:scene3d>
+    <dgm:sp3d/>
+    <dgm:txPr/>
+    <dgm:style>
+      <a:lnRef idx="2">
+        <a:scrgbClr r="0" g="0" b="0"/>
+      </a:lnRef>
+      <a:fillRef idx="1">
+        <a:scrgbClr r="0" g="0" b="0"/>
+      </a:fillRef>
+      <a:effectRef idx="0">
+        <a:scrgbClr r="0" g="0" b="0"/>
+      </a:effectRef>
+      <a:fontRef idx="minor"/>
+    </dgm:style>
+  </dgm:styleLbl>
+  <dgm:styleLbl name="alignAcc1">
+    <dgm:scene3d>
+      <a:camera prst="orthographicFront"/>
+      <a:lightRig rig="threePt" dir="t"/>
+    </dgm:scene3d>
+    <dgm:sp3d/>
+    <dgm:txPr/>
+    <dgm:style>
+      <a:lnRef idx="2">
+        <a:scrgbClr r="0" g="0" b="0"/>
+      </a:lnRef>
+      <a:fillRef idx="1">
+        <a:scrgbClr r="0" g="0" b="0"/>
+      </a:fillRef>
+      <a:effectRef idx="0">
+        <a:scrgbClr r="0" g="0" b="0"/>
+      </a:effectRef>
+      <a:fontRef idx="minor"/>
+    </dgm:style>
+  </dgm:styleLbl>
+  <dgm:styleLbl name="trAlignAcc1">
+    <dgm:scene3d>
+      <a:camera prst="orthographicFront"/>
+      <a:lightRig rig="threePt" dir="t"/>
+    </dgm:scene3d>
+    <dgm:sp3d/>
+    <dgm:txPr/>
+    <dgm:style>
+      <a:lnRef idx="1">
+        <a:scrgbClr r="0" g="0" b="0"/>
+      </a:lnRef>
+      <a:fillRef idx="1">
+        <a:scrgbClr r="0" g="0" b="0"/>
+      </a:fillRef>
+      <a:effectRef idx="0">
+        <a:scrgbClr r="0" g="0" b="0"/>
+      </a:effectRef>
+      <a:fontRef idx="minor"/>
+    </dgm:style>
+  </dgm:styleLbl>
+  <dgm:styleLbl name="bgAcc1">
+    <dgm:scene3d>
+      <a:camera prst="orthographicFront"/>
+      <a:lightRig rig="threePt" dir="t"/>
+    </dgm:scene3d>
+    <dgm:sp3d/>
+    <dgm:txPr/>
+    <dgm:style>
+      <a:lnRef idx="2">
+        <a:scrgbClr r="0" g="0" b="0"/>
+      </a:lnRef>
+      <a:fillRef idx="1">
+        <a:scrgbClr r="0" g="0" b="0"/>
+      </a:fillRef>
+      <a:effectRef idx="0">
+        <a:scrgbClr r="0" g="0" b="0"/>
+      </a:effectRef>
+      <a:fontRef idx="minor"/>
+    </dgm:style>
+  </dgm:styleLbl>
+  <dgm:styleLbl name="solidFgAcc1">
+    <dgm:scene3d>
+      <a:camera prst="orthographicFront"/>
+      <a:lightRig rig="threePt" dir="t"/>
+    </dgm:scene3d>
+    <dgm:sp3d/>
+    <dgm:txPr/>
+    <dgm:style>
+      <a:lnRef idx="2">
+        <a:scrgbClr r="0" g="0" b="0"/>
+      </a:lnRef>
+      <a:fillRef idx="1">
+        <a:scrgbClr r="0" g="0" b="0"/>
+      </a:fillRef>
+      <a:effectRef idx="0">
+        <a:scrgbClr r="0" g="0" b="0"/>
+      </a:effectRef>
+      <a:fontRef idx="minor"/>
+    </dgm:style>
+  </dgm:styleLbl>
+  <dgm:styleLbl name="solidAlignAcc1">
+    <dgm:scene3d>
+      <a:camera prst="orthographicFront"/>
+      <a:lightRig rig="threePt" dir="t"/>
+    </dgm:scene3d>
+    <dgm:sp3d/>
+    <dgm:txPr/>
+    <dgm:style>
+      <a:lnRef idx="2">
+        <a:scrgbClr r="0" g="0" b="0"/>
+      </a:lnRef>
+      <a:fillRef idx="1">
+        <a:scrgbClr r="0" g="0" b="0"/>
+      </a:fillRef>
+      <a:effectRef idx="0">
+        <a:scrgbClr r="0" g="0" b="0"/>
+      </a:effectRef>
+      <a:fontRef idx="minor"/>
+    </dgm:style>
+  </dgm:styleLbl>
+  <dgm:styleLbl name="solidBgAcc1">
+    <dgm:scene3d>
+      <a:camera prst="orthographicFront"/>
+      <a:lightRig rig="threePt" dir="t"/>
+    </dgm:scene3d>
+    <dgm:sp3d/>
+    <dgm:txPr/>
+    <dgm:style>
+      <a:lnRef idx="2">
+        <a:scrgbClr r="0" g="0" b="0"/>
+      </a:lnRef>
+      <a:fillRef idx="1">
+        <a:scrgbClr r="0" g="0" b="0"/>
+      </a:fillRef>
+      <a:effectRef idx="0">
+        <a:scrgbClr r="0" g="0" b="0"/>
+      </a:effectRef>
+      <a:fontRef idx="minor"/>
+    </dgm:style>
+  </dgm:styleLbl>
+  <dgm:styleLbl name="fgAccFollowNode1">
+    <dgm:scene3d>
+      <a:camera prst="orthographicFront"/>
+      <a:lightRig rig="threePt" dir="t"/>
+    </dgm:scene3d>
+    <dgm:sp3d/>
+    <dgm:txPr/>
+    <dgm:style>
+      <a:lnRef idx="2">
+        <a:scrgbClr r="0" g="0" b="0"/>
+      </a:lnRef>
+      <a:fillRef idx="1">
+        <a:scrgbClr r="0" g="0" b="0"/>
+      </a:fillRef>
+      <a:effectRef idx="0">
+        <a:scrgbClr r="0" g="0" b="0"/>
+      </a:effectRef>
+      <a:fontRef idx="minor"/>
+    </dgm:style>
+  </dgm:styleLbl>
+  <dgm:styleLbl name="alignAccFollowNode1">
+    <dgm:scene3d>
+      <a:camera prst="orthographicFront"/>
+      <a:lightRig rig="threePt" dir="t"/>
+    </dgm:scene3d>
+    <dgm:sp3d/>
+    <dgm:txPr/>
+    <dgm:style>
+      <a:lnRef idx="2">
+        <a:scrgbClr r="0" g="0" b="0"/>
+      </a:lnRef>
+      <a:fillRef idx="1">
+        <a:scrgbClr r="0" g="0" b="0"/>
+      </a:fillRef>
+      <a:effectRef idx="0">
+        <a:scrgbClr r="0" g="0" b="0"/>
+      </a:effectRef>
+      <a:fontRef idx="minor"/>
+    </dgm:style>
+  </dgm:styleLbl>
+  <dgm:styleLbl name="bgAccFollowNode1">
+    <dgm:scene3d>
+      <a:camera prst="orthographicFront"/>
+      <a:lightRig rig="threePt" dir="t"/>
+    </dgm:scene3d>
+    <dgm:sp3d/>
+    <dgm:txPr/>
+    <dgm:style>
+      <a:lnRef idx="2">
+        <a:scrgbClr r="0" g="0" b="0"/>
+      </a:lnRef>
+      <a:fillRef idx="1">
+        <a:scrgbClr r="0" g="0" b="0"/>
+      </a:fillRef>
+      <a:effectRef idx="0">
+        <a:scrgbClr r="0" g="0" b="0"/>
+      </a:effectRef>
+      <a:fontRef idx="minor"/>
+    </dgm:style>
+  </dgm:styleLbl>
+  <dgm:styleLbl name="fgAcc0">
+    <dgm:scene3d>
+      <a:camera prst="orthographicFront"/>
+      <a:lightRig rig="threePt" dir="t"/>
+    </dgm:scene3d>
+    <dgm:sp3d/>
+    <dgm:txPr/>
+    <dgm:style>
+      <a:lnRef idx="2">
+        <a:scrgbClr r="0" g="0" b="0"/>
+      </a:lnRef>
+      <a:fillRef idx="1">
+        <a:scrgbClr r="0" g="0" b="0"/>
+      </a:fillRef>
+      <a:effectRef idx="0">
+        <a:scrgbClr r="0" g="0" b="0"/>
+      </a:effectRef>
+      <a:fontRef idx="minor"/>
+    </dgm:style>
+  </dgm:styleLbl>
+  <dgm:styleLbl name="fgAcc2">
+    <dgm:scene3d>
+      <a:camera prst="orthographicFront"/>
+      <a:lightRig rig="threePt" dir="t"/>
+    </dgm:scene3d>
+    <dgm:sp3d/>
+    <dgm:txPr/>
+    <dgm:style>
+      <a:lnRef idx="2">
+        <a:scrgbClr r="0" g="0" b="0"/>
+      </a:lnRef>
+      <a:fillRef idx="1">
+        <a:scrgbClr r="0" g="0" b="0"/>
+      </a:fillRef>
+      <a:effectRef idx="0">
+        <a:scrgbClr r="0" g="0" b="0"/>
+      </a:effectRef>
+      <a:fontRef idx="minor"/>
+    </dgm:style>
+  </dgm:styleLbl>
+  <dgm:styleLbl name="fgAcc3">
+    <dgm:scene3d>
+      <a:camera prst="orthographicFront"/>
+      <a:lightRig rig="threePt" dir="t"/>
+    </dgm:scene3d>
+    <dgm:sp3d/>
+    <dgm:txPr/>
+    <dgm:style>
+      <a:lnRef idx="2">
+        <a:scrgbClr r="0" g="0" b="0"/>
+      </a:lnRef>
+      <a:fillRef idx="1">
+        <a:scrgbClr r="0" g="0" b="0"/>
+      </a:fillRef>
+      <a:effectRef idx="0">
+        <a:scrgbClr r="0" g="0" b="0"/>
+      </a:effectRef>
+      <a:fontRef idx="minor"/>
+    </dgm:style>
+  </dgm:styleLbl>
+  <dgm:styleLbl name="fgAcc4">
+    <dgm:scene3d>
+      <a:camera prst="orthographicFront"/>
+      <a:lightRig rig="threePt" dir="t"/>
+    </dgm:scene3d>
+    <dgm:sp3d/>
+    <dgm:txPr/>
+    <dgm:style>
+      <a:lnRef idx="2">
+        <a:scrgbClr r="0" g="0" b="0"/>
+      </a:lnRef>
+      <a:fillRef idx="1">
+        <a:scrgbClr r="0" g="0" b="0"/>
+      </a:fillRef>
+      <a:effectRef idx="0">
+        <a:scrgbClr r="0" g="0" b="0"/>
+      </a:effectRef>
+      <a:fontRef idx="minor"/>
+    </dgm:style>
+  </dgm:styleLbl>
+  <dgm:styleLbl name="bgShp">
+    <dgm:scene3d>
+      <a:camera prst="orthographicFront"/>
+      <a:lightRig rig="threePt" dir="t"/>
+    </dgm:scene3d>
+    <dgm:sp3d/>
+    <dgm:txPr/>
+    <dgm:style>
+      <a:lnRef idx="0">
+        <a:scrgbClr r="0" g="0" b="0"/>
+      </a:lnRef>
+      <a:fillRef idx="1">
+        <a:scrgbClr r="0" g="0" b="0"/>
+      </a:fillRef>
+      <a:effectRef idx="0">
+        <a:scrgbClr r="0" g="0" b="0"/>
+      </a:effectRef>
+      <a:fontRef idx="minor"/>
+    </dgm:style>
+  </dgm:styleLbl>
+  <dgm:styleLbl name="dkBgShp">
+    <dgm:scene3d>
+      <a:camera prst="orthographicFront"/>
+      <a:lightRig rig="threePt" dir="t"/>
+    </dgm:scene3d>
+    <dgm:sp3d/>
+    <dgm:txPr/>
+    <dgm:style>
+      <a:lnRef idx="0">
+        <a:scrgbClr r="0" g="0" b="0"/>
+      </a:lnRef>
+      <a:fillRef idx="1">
+        <a:scrgbClr r="0" g="0" b="0"/>
+      </a:fillRef>
+      <a:effectRef idx="0">
+        <a:scrgbClr r="0" g="0" b="0"/>
+      </a:effectRef>
+      <a:fontRef idx="minor"/>
+    </dgm:style>
+  </dgm:styleLbl>
+  <dgm:styleLbl name="trBgShp">
+    <dgm:scene3d>
+      <a:camera prst="orthographicFront"/>
+      <a:lightRig rig="threePt" dir="t"/>
+    </dgm:scene3d>
+    <dgm:sp3d/>
+    <dgm:txPr/>
+    <dgm:style>
+      <a:lnRef idx="0">
+        <a:scrgbClr r="0" g="0" b="0"/>
+      </a:lnRef>
+      <a:fillRef idx="1">
+        <a:scrgbClr r="0" g="0" b="0"/>
+      </a:fillRef>
+      <a:effectRef idx="0">
+        <a:scrgbClr r="0" g="0" b="0"/>
+      </a:effectRef>
+      <a:fontRef idx="minor"/>
+    </dgm:style>
+  </dgm:styleLbl>
+  <dgm:styleLbl name="fgShp">
+    <dgm:scene3d>
+      <a:camera prst="orthographicFront"/>
+      <a:lightRig rig="threePt" dir="t"/>
+    </dgm:scene3d>
+    <dgm:sp3d/>
+    <dgm:txPr/>
+    <dgm:style>
+      <a:lnRef idx="2">
+        <a:scrgbClr r="0" g="0" b="0"/>
+      </a:lnRef>
+      <a:fillRef idx="1">
+        <a:scrgbClr r="0" g="0" b="0"/>
+      </a:fillRef>
+      <a:effectRef idx="0">
+        <a:scrgbClr r="0" g="0" b="0"/>
+      </a:effectRef>
+      <a:fontRef idx="minor"/>
+    </dgm:style>
+  </dgm:styleLbl>
+  <dgm:styleLbl name="revTx">
+    <dgm:scene3d>
+      <a:camera prst="orthographicFront"/>
+      <a:lightRig rig="threePt" dir="t"/>
+    </dgm:scene3d>
+    <dgm:sp3d/>
+    <dgm:txPr/>
+    <dgm:style>
+      <a:lnRef idx="0">
+        <a:scrgbClr r="0" g="0" b="0"/>
+      </a:lnRef>
+      <a:fillRef idx="0">
+        <a:scrgbClr r="0" g="0" b="0"/>
+      </a:fillRef>
+      <a:effectRef idx="0">
+        <a:scrgbClr r="0" g="0" b="0"/>
+      </a:effectRef>
+      <a:fontRef idx="minor"/>
+    </dgm:style>
+  </dgm:styleLbl>
+</dgm:styleDef>
+</file>
+
 <file path=ppt/notesMasters/notesMaster1.xml><?xml version="1.0" encoding="utf-8"?>
 <p:notesMaster xmlns:a="http://schemas.openxmlformats.org/drawingml/2006/main" xmlns:r="http://schemas.openxmlformats.org/officeDocument/2006/relationships" xmlns:p="http://schemas.openxmlformats.org/presentationml/2006/main">
   <p:cSld>
@@ -304,7 +3004,7 @@
             <a:fld id="{F48EC682-E3D2-4887-8B61-A20B6CA7B3E6}" type="datetimeFigureOut">
               <a:rPr lang="en-US" smtClean="0"/>
               <a:pPr/>
-              <a:t>4/19/2023</a:t>
+              <a:t>4/27/2023</a:t>
             </a:fld>
             <a:endParaRPr lang="en-US" dirty="0"/>
           </a:p>
@@ -3800,6 +6500,109 @@
           <a:chExt cx="0" cy="0"/>
         </a:xfrm>
       </p:grpSpPr>
+      <p:pic>
+        <p:nvPicPr>
+          <p:cNvPr id="25" name="Picture 24">
+            <a:extLst>
+              <a:ext uri="{FF2B5EF4-FFF2-40B4-BE49-F238E27FC236}">
+                <a16:creationId xmlns:a16="http://schemas.microsoft.com/office/drawing/2014/main" id="{AFCEBA90-3A4F-DA07-6FED-CDD2E15202E9}"/>
+              </a:ext>
+            </a:extLst>
+          </p:cNvPr>
+          <p:cNvPicPr>
+            <a:picLocks noChangeAspect="1"/>
+          </p:cNvPicPr>
+          <p:nvPr/>
+        </p:nvPicPr>
+        <p:blipFill>
+          <a:blip r:embed="rId4"/>
+          <a:stretch>
+            <a:fillRect/>
+          </a:stretch>
+        </p:blipFill>
+        <p:spPr>
+          <a:xfrm>
+            <a:off x="19302893" y="23619298"/>
+            <a:ext cx="18287999" cy="18328372"/>
+          </a:xfrm>
+          <a:prstGeom prst="rect">
+            <a:avLst/>
+          </a:prstGeom>
+        </p:spPr>
+      </p:pic>
+      <p:sp>
+        <p:nvSpPr>
+          <p:cNvPr id="17" name="Rectangle 16">
+            <a:extLst>
+              <a:ext uri="{FF2B5EF4-FFF2-40B4-BE49-F238E27FC236}">
+                <a16:creationId xmlns:a16="http://schemas.microsoft.com/office/drawing/2014/main" id="{B8BA402C-DEA1-2649-750D-165529682470}"/>
+              </a:ext>
+            </a:extLst>
+          </p:cNvPr>
+          <p:cNvSpPr/>
+          <p:nvPr/>
+        </p:nvSpPr>
+        <p:spPr bwMode="auto">
+          <a:xfrm>
+            <a:off x="19202400" y="12133898"/>
+            <a:ext cx="18287999" cy="9739264"/>
+          </a:xfrm>
+          <a:prstGeom prst="rect">
+            <a:avLst/>
+          </a:prstGeom>
+          <a:solidFill>
+            <a:srgbClr val="DCDCDC"/>
+          </a:solidFill>
+          <a:ln w="9525" cap="flat" cmpd="sng" algn="ctr">
+            <a:solidFill>
+              <a:schemeClr val="tx1"/>
+            </a:solidFill>
+            <a:prstDash val="solid"/>
+            <a:round/>
+            <a:headEnd type="none" w="med" len="med"/>
+            <a:tailEnd type="none" w="med" len="med"/>
+          </a:ln>
+          <a:effectLst/>
+        </p:spPr>
+        <p:txBody>
+          <a:bodyPr vert="horz" wrap="square" lIns="91440" tIns="45720" rIns="91440" bIns="45720" numCol="1" rtlCol="0" anchor="t" anchorCtr="0" compatLnSpc="1">
+            <a:prstTxWarp prst="textNoShape">
+              <a:avLst/>
+            </a:prstTxWarp>
+          </a:bodyPr>
+          <a:lstStyle/>
+          <a:p>
+            <a:pPr marL="0" marR="0" indent="0" algn="r" defTabSz="914400" rtl="0" eaLnBrk="0" fontAlgn="base" latinLnBrk="0" hangingPunct="0">
+              <a:lnSpc>
+                <a:spcPct val="100000"/>
+              </a:lnSpc>
+              <a:spcBef>
+                <a:spcPct val="0"/>
+              </a:spcBef>
+              <a:spcAft>
+                <a:spcPct val="0"/>
+              </a:spcAft>
+              <a:buClrTx/>
+              <a:buSzTx/>
+              <a:buFontTx/>
+              <a:buNone/>
+              <a:tabLst/>
+            </a:pPr>
+            <a:endParaRPr kumimoji="0" lang="en-US" sz="2400" b="1" i="1" u="none" strike="noStrike" cap="none" normalizeH="0" baseline="0">
+              <a:ln>
+                <a:noFill/>
+              </a:ln>
+              <a:solidFill>
+                <a:schemeClr val="tx1"/>
+              </a:solidFill>
+              <a:effectLst/>
+              <a:latin typeface="Arial" pitchFamily="-106" charset="0"/>
+              <a:ea typeface="ＭＳ Ｐゴシック" pitchFamily="-106" charset="-128"/>
+              <a:cs typeface="ＭＳ Ｐゴシック" pitchFamily="-106" charset="-128"/>
+            </a:endParaRPr>
+          </a:p>
+        </p:txBody>
+      </p:sp>
       <p:sp>
         <p:nvSpPr>
           <p:cNvPr id="13315" name="Text Box 7"/>
@@ -4158,51 +6961,6 @@
           </a:p>
         </p:txBody>
       </p:sp>
-      <p:sp>
-        <p:nvSpPr>
-          <p:cNvPr id="15" name="Rectangle 9">
-            <a:extLst>
-              <a:ext uri="{FF2B5EF4-FFF2-40B4-BE49-F238E27FC236}">
-                <a16:creationId xmlns:a16="http://schemas.microsoft.com/office/drawing/2014/main" id="{1A55EF38-4803-CA2C-D05D-F0F1142D6103}"/>
-              </a:ext>
-            </a:extLst>
-          </p:cNvPr>
-          <p:cNvSpPr>
-            <a:spLocks noChangeArrowheads="1"/>
-          </p:cNvSpPr>
-          <p:nvPr/>
-        </p:nvSpPr>
-        <p:spPr bwMode="auto">
-          <a:xfrm>
-            <a:off x="914401" y="10439400"/>
-            <a:ext cx="36440382" cy="31331917"/>
-          </a:xfrm>
-          <a:prstGeom prst="rect">
-            <a:avLst/>
-          </a:prstGeom>
-          <a:solidFill>
-            <a:srgbClr val="DCDCDC"/>
-          </a:solidFill>
-          <a:ln w="76200">
-            <a:solidFill>
-              <a:schemeClr val="tx1"/>
-            </a:solidFill>
-            <a:miter lim="800000"/>
-            <a:headEnd/>
-            <a:tailEnd/>
-          </a:ln>
-        </p:spPr>
-        <p:txBody>
-          <a:bodyPr wrap="none" anchor="ctr"/>
-          <a:lstStyle/>
-          <a:p>
-            <a:r>
-              <a:rPr lang="en-US" dirty="0"/>
-              <a:t> </a:t>
-            </a:r>
-          </a:p>
-        </p:txBody>
-      </p:sp>
       <p:pic>
         <p:nvPicPr>
           <p:cNvPr id="1026" name="Picture 2">
@@ -4218,7 +6976,7 @@
           <p:nvPr/>
         </p:nvPicPr>
         <p:blipFill>
-          <a:blip r:embed="rId3">
+          <a:blip r:embed="rId5">
             <a:extLst>
               <a:ext uri="{28A0092B-C50C-407E-A947-70E740481C1C}">
                 <a14:useLocalDpi xmlns:a14="http://schemas.microsoft.com/office/drawing/2010/main" val="0"/>
@@ -4265,7 +7023,7 @@
           <p:nvPr/>
         </p:nvPicPr>
         <p:blipFill>
-          <a:blip r:embed="rId4"/>
+          <a:blip r:embed="rId6"/>
           <a:stretch>
             <a:fillRect/>
           </a:stretch>
@@ -4295,7 +7053,7 @@
           <p:nvPr/>
         </p:nvPicPr>
         <p:blipFill>
-          <a:blip r:embed="rId5"/>
+          <a:blip r:embed="rId7"/>
           <a:stretch>
             <a:fillRect/>
           </a:stretch>
@@ -4325,7 +7083,7 @@
           <p:nvPr/>
         </p:nvPicPr>
         <p:blipFill>
-          <a:blip r:embed="rId6"/>
+          <a:blip r:embed="rId8"/>
           <a:stretch>
             <a:fillRect/>
           </a:stretch>
@@ -4377,10 +7135,10 @@
       </p:sp>
       <p:sp>
         <p:nvSpPr>
-          <p:cNvPr id="9" name="TextBox 8">
+          <p:cNvPr id="6" name="TextBox 5">
             <a:extLst>
               <a:ext uri="{FF2B5EF4-FFF2-40B4-BE49-F238E27FC236}">
-                <a16:creationId xmlns:a16="http://schemas.microsoft.com/office/drawing/2014/main" id="{1F8CEFA9-A90B-5582-8BF5-C368D75CEA5F}"/>
+                <a16:creationId xmlns:a16="http://schemas.microsoft.com/office/drawing/2014/main" id="{A86388CF-67AD-DA7A-79C4-B2D308F7E875}"/>
               </a:ext>
             </a:extLst>
           </p:cNvPr>
@@ -4389,8 +7147,362 @@
         </p:nvSpPr>
         <p:spPr>
           <a:xfrm>
-            <a:off x="23349856" y="11231902"/>
-            <a:ext cx="12563173" cy="18789759"/>
+            <a:off x="8665029" y="10875247"/>
+            <a:ext cx="3429000" cy="1015663"/>
+          </a:xfrm>
+          <a:prstGeom prst="rect">
+            <a:avLst/>
+          </a:prstGeom>
+          <a:noFill/>
+        </p:spPr>
+        <p:txBody>
+          <a:bodyPr wrap="square">
+            <a:spAutoFit/>
+          </a:bodyPr>
+          <a:lstStyle/>
+          <a:p>
+            <a:pPr algn="l"/>
+            <a:r>
+              <a:rPr lang="en-US" sz="6000" dirty="0"/>
+              <a:t>Purpose</a:t>
+            </a:r>
+          </a:p>
+        </p:txBody>
+      </p:sp>
+      <p:sp>
+        <p:nvSpPr>
+          <p:cNvPr id="13" name="TextBox 12">
+            <a:extLst>
+              <a:ext uri="{FF2B5EF4-FFF2-40B4-BE49-F238E27FC236}">
+                <a16:creationId xmlns:a16="http://schemas.microsoft.com/office/drawing/2014/main" id="{0A9F3227-E88D-B78F-EEDF-D44FD65691DC}"/>
+              </a:ext>
+            </a:extLst>
+          </p:cNvPr>
+          <p:cNvSpPr txBox="1"/>
+          <p:nvPr/>
+        </p:nvSpPr>
+        <p:spPr>
+          <a:xfrm>
+            <a:off x="23915637" y="10672387"/>
+            <a:ext cx="8616215" cy="1015663"/>
+          </a:xfrm>
+          <a:prstGeom prst="rect">
+            <a:avLst/>
+          </a:prstGeom>
+          <a:noFill/>
+        </p:spPr>
+        <p:txBody>
+          <a:bodyPr wrap="square">
+            <a:spAutoFit/>
+          </a:bodyPr>
+          <a:lstStyle/>
+          <a:p>
+            <a:pPr algn="just"/>
+            <a:r>
+              <a:rPr lang="en-US" sz="6000" dirty="0"/>
+              <a:t>Algorithm Validation</a:t>
+            </a:r>
+          </a:p>
+        </p:txBody>
+      </p:sp>
+      <p:sp>
+        <p:nvSpPr>
+          <p:cNvPr id="16" name="TextBox 15">
+            <a:extLst>
+              <a:ext uri="{FF2B5EF4-FFF2-40B4-BE49-F238E27FC236}">
+                <a16:creationId xmlns:a16="http://schemas.microsoft.com/office/drawing/2014/main" id="{F5BC1879-49EF-8980-5BC4-E73D8B4D566F}"/>
+              </a:ext>
+            </a:extLst>
+          </p:cNvPr>
+          <p:cNvSpPr txBox="1"/>
+          <p:nvPr/>
+        </p:nvSpPr>
+        <p:spPr>
+          <a:xfrm>
+            <a:off x="19715629" y="11830032"/>
+            <a:ext cx="16965670" cy="9725739"/>
+          </a:xfrm>
+          <a:prstGeom prst="rect">
+            <a:avLst/>
+          </a:prstGeom>
+          <a:noFill/>
+        </p:spPr>
+        <p:txBody>
+          <a:bodyPr wrap="square">
+            <a:spAutoFit/>
+          </a:bodyPr>
+          <a:lstStyle/>
+          <a:p>
+            <a:pPr algn="just"/>
+            <a:endParaRPr lang="en-US" sz="4000" b="0" i="0" dirty="0"/>
+          </a:p>
+          <a:p>
+            <a:pPr algn="just"/>
+            <a:r>
+              <a:rPr lang="en-US" sz="4200" b="0" i="0" dirty="0"/>
+              <a:t>Plans to generate validation tests for the following types of analyses:</a:t>
+            </a:r>
+          </a:p>
+          <a:p>
+            <a:pPr marL="685800" indent="-685800" algn="just">
+              <a:buFont typeface="Arial" panose="020B0604020202020204" pitchFamily="34" charset="0"/>
+              <a:buChar char="•"/>
+            </a:pPr>
+            <a:endParaRPr lang="en-US" sz="4200" b="0" i="0" dirty="0"/>
+          </a:p>
+          <a:p>
+            <a:pPr marL="685800" indent="-685800" algn="just">
+              <a:buFont typeface="Arial" panose="020B0604020202020204" pitchFamily="34" charset="0"/>
+              <a:buChar char="•"/>
+            </a:pPr>
+            <a:r>
+              <a:rPr lang="en-US" sz="4200" b="0" i="0" dirty="0"/>
+              <a:t>Estimating system degradation</a:t>
+            </a:r>
+          </a:p>
+          <a:p>
+            <a:pPr marL="685800" indent="-685800" algn="just">
+              <a:buFont typeface="Arial" panose="020B0604020202020204" pitchFamily="34" charset="0"/>
+              <a:buChar char="•"/>
+            </a:pPr>
+            <a:r>
+              <a:rPr lang="en-US" sz="4200" b="0" i="0" dirty="0"/>
+              <a:t>Estimating soiling rate/ratio\</a:t>
+            </a:r>
+          </a:p>
+          <a:p>
+            <a:pPr marL="685800" indent="-685800" algn="just">
+              <a:buFont typeface="Arial" panose="020B0604020202020204" pitchFamily="34" charset="0"/>
+              <a:buChar char="•"/>
+            </a:pPr>
+            <a:r>
+              <a:rPr lang="en-US" sz="4200" b="0" i="0" dirty="0"/>
+              <a:t>Detecting time zone/shift issues</a:t>
+            </a:r>
+          </a:p>
+          <a:p>
+            <a:pPr marL="685800" indent="-685800" algn="just">
+              <a:buFont typeface="Arial" panose="020B0604020202020204" pitchFamily="34" charset="0"/>
+              <a:buChar char="•"/>
+            </a:pPr>
+            <a:r>
+              <a:rPr lang="en-US" sz="4200" b="0" i="0" dirty="0"/>
+              <a:t>Estimating azimuth and tilt of a PV system</a:t>
+            </a:r>
+          </a:p>
+          <a:p>
+            <a:pPr marL="685800" indent="-685800" algn="just">
+              <a:buFont typeface="Arial" panose="020B0604020202020204" pitchFamily="34" charset="0"/>
+              <a:buChar char="•"/>
+            </a:pPr>
+            <a:r>
+              <a:rPr lang="en-US" sz="4200" b="0" i="0" dirty="0"/>
+              <a:t>Determining inverter ‘clipping’ intervals</a:t>
+            </a:r>
+          </a:p>
+          <a:p>
+            <a:pPr marL="685800" indent="-685800" algn="just">
+              <a:buFont typeface="Arial" panose="020B0604020202020204" pitchFamily="34" charset="0"/>
+              <a:buChar char="•"/>
+            </a:pPr>
+            <a:r>
+              <a:rPr lang="en-US" sz="4200" b="0" i="0" dirty="0"/>
+              <a:t>And more!</a:t>
+            </a:r>
+          </a:p>
+          <a:p>
+            <a:pPr marL="685800" indent="-685800" algn="just">
+              <a:buFont typeface="Arial" panose="020B0604020202020204" pitchFamily="34" charset="0"/>
+              <a:buChar char="•"/>
+            </a:pPr>
+            <a:endParaRPr lang="en-US" sz="4000" b="0" i="0" dirty="0"/>
+          </a:p>
+          <a:p>
+            <a:pPr algn="just"/>
+            <a:r>
+              <a:rPr lang="en-US" sz="5000" i="0" dirty="0"/>
+              <a:t>Robust Ground Truth Data Sets</a:t>
+            </a:r>
+          </a:p>
+          <a:p>
+            <a:pPr algn="just"/>
+            <a:endParaRPr lang="en-US" sz="4000" b="0" i="0" dirty="0"/>
+          </a:p>
+          <a:p>
+            <a:pPr marL="685800" indent="-685800" algn="just">
+              <a:buFont typeface="Arial" panose="020B0604020202020204" pitchFamily="34" charset="0"/>
+              <a:buChar char="•"/>
+            </a:pPr>
+            <a:r>
+              <a:rPr lang="en-US" sz="4200" b="0" i="0" dirty="0"/>
+              <a:t>Labeled measured data</a:t>
+            </a:r>
+          </a:p>
+          <a:p>
+            <a:pPr marL="685800" indent="-685800" algn="just">
+              <a:buFont typeface="Arial" panose="020B0604020202020204" pitchFamily="34" charset="0"/>
+              <a:buChar char="•"/>
+            </a:pPr>
+            <a:r>
+              <a:rPr lang="en-US" sz="4200" b="0" i="0" dirty="0"/>
+              <a:t>Synthetic data sets with typical field data issues (capacity issues, outages, soiling, shading, etc.) </a:t>
+            </a:r>
+          </a:p>
+        </p:txBody>
+      </p:sp>
+      <p:sp>
+        <p:nvSpPr>
+          <p:cNvPr id="18" name="Rectangle 17">
+            <a:extLst>
+              <a:ext uri="{FF2B5EF4-FFF2-40B4-BE49-F238E27FC236}">
+                <a16:creationId xmlns:a16="http://schemas.microsoft.com/office/drawing/2014/main" id="{2492E2D0-2F3D-ED6D-E55F-E3E74495AD88}"/>
+              </a:ext>
+            </a:extLst>
+          </p:cNvPr>
+          <p:cNvSpPr/>
+          <p:nvPr/>
+        </p:nvSpPr>
+        <p:spPr bwMode="auto">
+          <a:xfrm>
+            <a:off x="890107" y="12133897"/>
+            <a:ext cx="17474094" cy="5599393"/>
+          </a:xfrm>
+          <a:prstGeom prst="rect">
+            <a:avLst/>
+          </a:prstGeom>
+          <a:solidFill>
+            <a:srgbClr val="DCDCDC"/>
+          </a:solidFill>
+          <a:ln w="9525" cap="flat" cmpd="sng" algn="ctr">
+            <a:solidFill>
+              <a:schemeClr val="tx1"/>
+            </a:solidFill>
+            <a:prstDash val="solid"/>
+            <a:round/>
+            <a:headEnd type="none" w="med" len="med"/>
+            <a:tailEnd type="none" w="med" len="med"/>
+          </a:ln>
+          <a:effectLst/>
+        </p:spPr>
+        <p:txBody>
+          <a:bodyPr vert="horz" wrap="square" lIns="91440" tIns="45720" rIns="91440" bIns="45720" numCol="1" rtlCol="0" anchor="t" anchorCtr="0" compatLnSpc="1">
+            <a:prstTxWarp prst="textNoShape">
+              <a:avLst/>
+            </a:prstTxWarp>
+          </a:bodyPr>
+          <a:lstStyle/>
+          <a:p>
+            <a:pPr algn="l"/>
+            <a:endParaRPr lang="en-US" sz="5000" dirty="0"/>
+          </a:p>
+        </p:txBody>
+      </p:sp>
+      <p:sp>
+        <p:nvSpPr>
+          <p:cNvPr id="19" name="Rectangle 18">
+            <a:extLst>
+              <a:ext uri="{FF2B5EF4-FFF2-40B4-BE49-F238E27FC236}">
+                <a16:creationId xmlns:a16="http://schemas.microsoft.com/office/drawing/2014/main" id="{EC82BA22-098D-75DA-1CFD-2D368939A67C}"/>
+              </a:ext>
+            </a:extLst>
+          </p:cNvPr>
+          <p:cNvSpPr/>
+          <p:nvPr/>
+        </p:nvSpPr>
+        <p:spPr bwMode="auto">
+          <a:xfrm>
+            <a:off x="890105" y="19337718"/>
+            <a:ext cx="17474094" cy="22694470"/>
+          </a:xfrm>
+          <a:prstGeom prst="rect">
+            <a:avLst/>
+          </a:prstGeom>
+          <a:solidFill>
+            <a:srgbClr val="DCDCDC"/>
+          </a:solidFill>
+          <a:ln w="9525" cap="flat" cmpd="sng" algn="ctr">
+            <a:solidFill>
+              <a:schemeClr val="tx1"/>
+            </a:solidFill>
+            <a:prstDash val="solid"/>
+            <a:round/>
+            <a:headEnd type="none" w="med" len="med"/>
+            <a:tailEnd type="none" w="med" len="med"/>
+          </a:ln>
+          <a:effectLst/>
+        </p:spPr>
+        <p:txBody>
+          <a:bodyPr vert="horz" wrap="square" lIns="91440" tIns="45720" rIns="91440" bIns="45720" numCol="1" rtlCol="0" anchor="t" anchorCtr="0" compatLnSpc="1">
+            <a:prstTxWarp prst="textNoShape">
+              <a:avLst/>
+            </a:prstTxWarp>
+          </a:bodyPr>
+          <a:lstStyle/>
+          <a:p>
+            <a:pPr marL="685800" indent="-685800" algn="l">
+              <a:buFont typeface="Arial" panose="020B0604020202020204" pitchFamily="34" charset="0"/>
+              <a:buChar char="•"/>
+            </a:pPr>
+            <a:endParaRPr lang="en-US" sz="5000" dirty="0"/>
+          </a:p>
+          <a:p>
+            <a:pPr algn="l"/>
+            <a:endParaRPr lang="en-US" sz="5000" dirty="0"/>
+          </a:p>
+        </p:txBody>
+      </p:sp>
+      <p:sp>
+        <p:nvSpPr>
+          <p:cNvPr id="21" name="TextBox 20">
+            <a:extLst>
+              <a:ext uri="{FF2B5EF4-FFF2-40B4-BE49-F238E27FC236}">
+                <a16:creationId xmlns:a16="http://schemas.microsoft.com/office/drawing/2014/main" id="{2A7B1AE6-4232-3AE8-A8F4-AEC4DF4E1535}"/>
+              </a:ext>
+            </a:extLst>
+          </p:cNvPr>
+          <p:cNvSpPr txBox="1"/>
+          <p:nvPr/>
+        </p:nvSpPr>
+        <p:spPr>
+          <a:xfrm>
+            <a:off x="5105401" y="18181887"/>
+            <a:ext cx="10820399" cy="1015663"/>
+          </a:xfrm>
+          <a:prstGeom prst="rect">
+            <a:avLst/>
+          </a:prstGeom>
+          <a:noFill/>
+        </p:spPr>
+        <p:txBody>
+          <a:bodyPr wrap="square">
+            <a:spAutoFit/>
+          </a:bodyPr>
+          <a:lstStyle/>
+          <a:p>
+            <a:pPr algn="l"/>
+            <a:r>
+              <a:rPr lang="en-US" sz="6000" dirty="0"/>
+              <a:t>Validation Hub Outputs</a:t>
+            </a:r>
+          </a:p>
+        </p:txBody>
+      </p:sp>
+      <p:sp>
+        <p:nvSpPr>
+          <p:cNvPr id="22" name="TextBox 21">
+            <a:extLst>
+              <a:ext uri="{FF2B5EF4-FFF2-40B4-BE49-F238E27FC236}">
+                <a16:creationId xmlns:a16="http://schemas.microsoft.com/office/drawing/2014/main" id="{AD6689A0-DCD9-EABC-5E9A-DD496A5AE9B0}"/>
+              </a:ext>
+            </a:extLst>
+          </p:cNvPr>
+          <p:cNvSpPr txBox="1"/>
+          <p:nvPr/>
+        </p:nvSpPr>
+        <p:spPr>
+          <a:xfrm>
+            <a:off x="1687355" y="19899395"/>
+            <a:ext cx="16257960" cy="8679299"/>
           </a:xfrm>
           <a:prstGeom prst="rect">
             <a:avLst/>
@@ -4403,196 +7515,160 @@
           </a:bodyPr>
           <a:lstStyle/>
           <a:p>
-            <a:pPr algn="just"/>
-            <a:r>
-              <a:rPr lang="en-US" sz="4500" dirty="0"/>
-              <a:t>Algorithm Validation</a:t>
-            </a:r>
-          </a:p>
-          <a:p>
-            <a:pPr algn="just"/>
-            <a:endParaRPr lang="en-US" sz="4500" dirty="0"/>
-          </a:p>
-          <a:p>
-            <a:pPr algn="just"/>
-            <a:r>
-              <a:rPr lang="en-US" sz="4500" dirty="0"/>
-              <a:t>Plans to generate validation tests for the following types of analyses:</a:t>
-            </a:r>
-          </a:p>
-          <a:p>
-            <a:pPr marL="685800" indent="-685800" algn="just">
+            <a:pPr algn="l"/>
+            <a:r>
+              <a:rPr lang="en-US" sz="5000" i="0" dirty="0"/>
+              <a:t>Developer Role</a:t>
+            </a:r>
+          </a:p>
+          <a:p>
+            <a:pPr algn="l"/>
+            <a:endParaRPr lang="en-US" sz="4000" b="0" i="0" dirty="0"/>
+          </a:p>
+          <a:p>
+            <a:pPr marL="685800" indent="-685800" algn="l">
               <a:buFont typeface="Arial" panose="020B0604020202020204" pitchFamily="34" charset="0"/>
               <a:buChar char="•"/>
             </a:pPr>
-            <a:endParaRPr lang="en-US" sz="4500" dirty="0"/>
-          </a:p>
-          <a:p>
-            <a:pPr marL="685800" indent="-685800" algn="just">
+            <a:r>
+              <a:rPr lang="en-US" sz="4200" b="0" i="0" dirty="0"/>
+              <a:t>Public reporting: Scoreboard benchmarking all submitted algorithms’ performance</a:t>
+            </a:r>
+          </a:p>
+          <a:p>
+            <a:pPr marL="685800" indent="-685800" algn="l">
               <a:buFont typeface="Arial" panose="020B0604020202020204" pitchFamily="34" charset="0"/>
               <a:buChar char="•"/>
             </a:pPr>
             <a:r>
-              <a:rPr lang="en-US" sz="4500" dirty="0"/>
-              <a:t>Detecting time shifts in PV time series data</a:t>
-            </a:r>
-          </a:p>
-          <a:p>
-            <a:pPr marL="685800" indent="-685800" algn="just">
+              <a:rPr lang="en-US" sz="4200" b="0" i="0" dirty="0"/>
+              <a:t>Private reporting: Detailed results returned to the developer, including how the algorithm performs in certain scenarios (ex: data at different sampling frequencies)</a:t>
+            </a:r>
+          </a:p>
+          <a:p>
+            <a:pPr marL="685800" indent="-685800" algn="l">
               <a:buFont typeface="Arial" panose="020B0604020202020204" pitchFamily="34" charset="0"/>
               <a:buChar char="•"/>
             </a:pPr>
-            <a:r>
-              <a:rPr lang="en-US" sz="4500" dirty="0"/>
-              <a:t>Estimating azimuth and tilt of a PV system</a:t>
-            </a:r>
-          </a:p>
-          <a:p>
-            <a:pPr marL="685800" indent="-685800" algn="just">
+            <a:endParaRPr lang="en-US" sz="4200" b="0" i="0" dirty="0"/>
+          </a:p>
+          <a:p>
+            <a:pPr marL="0" marR="0" lvl="0" indent="0" algn="l" defTabSz="914400" rtl="0" eaLnBrk="0" fontAlgn="base" latinLnBrk="0" hangingPunct="0">
+              <a:lnSpc>
+                <a:spcPct val="100000"/>
+              </a:lnSpc>
+              <a:spcBef>
+                <a:spcPct val="0"/>
+              </a:spcBef>
+              <a:spcAft>
+                <a:spcPct val="0"/>
+              </a:spcAft>
+              <a:buClrTx/>
+              <a:buSzTx/>
+              <a:buFontTx/>
+              <a:buNone/>
+              <a:tabLst/>
+              <a:defRPr/>
+            </a:pPr>
+            <a:r>
+              <a:rPr kumimoji="0" lang="en-US" sz="5000" i="0" u="none" strike="noStrike" kern="1200" cap="none" spc="0" normalizeH="0" baseline="0" noProof="0" dirty="0">
+                <a:ln>
+                  <a:noFill/>
+                </a:ln>
+                <a:solidFill>
+                  <a:srgbClr val="000000"/>
+                </a:solidFill>
+                <a:effectLst/>
+                <a:uLnTx/>
+                <a:uFillTx/>
+                <a:latin typeface="Arial" charset="0"/>
+                <a:ea typeface="ＭＳ Ｐゴシック" charset="-128"/>
+              </a:rPr>
+              <a:t>User Role</a:t>
+            </a:r>
+          </a:p>
+          <a:p>
+            <a:pPr marL="0" marR="0" lvl="0" indent="0" algn="l" defTabSz="914400" rtl="0" eaLnBrk="0" fontAlgn="base" latinLnBrk="0" hangingPunct="0">
+              <a:lnSpc>
+                <a:spcPct val="100000"/>
+              </a:lnSpc>
+              <a:spcBef>
+                <a:spcPct val="0"/>
+              </a:spcBef>
+              <a:spcAft>
+                <a:spcPct val="0"/>
+              </a:spcAft>
+              <a:buClrTx/>
+              <a:buSzTx/>
+              <a:buFontTx/>
+              <a:buNone/>
+              <a:tabLst/>
+              <a:defRPr/>
+            </a:pPr>
+            <a:endParaRPr kumimoji="0" lang="en-US" sz="4000" b="0" i="0" u="none" strike="noStrike" kern="1200" cap="none" spc="0" normalizeH="0" baseline="0" noProof="0" dirty="0">
+              <a:ln>
+                <a:noFill/>
+              </a:ln>
+              <a:solidFill>
+                <a:srgbClr val="000000"/>
+              </a:solidFill>
+              <a:effectLst/>
+              <a:uLnTx/>
+              <a:uFillTx/>
+              <a:latin typeface="Arial" charset="0"/>
+              <a:ea typeface="ＭＳ Ｐゴシック" charset="-128"/>
+            </a:endParaRPr>
+          </a:p>
+          <a:p>
+            <a:pPr marL="685800" marR="0" lvl="0" indent="-685800" algn="l" defTabSz="914400" rtl="0" eaLnBrk="0" fontAlgn="base" latinLnBrk="0" hangingPunct="0">
+              <a:lnSpc>
+                <a:spcPct val="100000"/>
+              </a:lnSpc>
+              <a:spcBef>
+                <a:spcPct val="0"/>
+              </a:spcBef>
+              <a:spcAft>
+                <a:spcPct val="0"/>
+              </a:spcAft>
+              <a:buClrTx/>
+              <a:buSzTx/>
+              <a:buFont typeface="Arial" panose="020B0604020202020204" pitchFamily="34" charset="0"/>
+              <a:buChar char="•"/>
+              <a:tabLst/>
+              <a:defRPr/>
+            </a:pPr>
+            <a:r>
+              <a:rPr kumimoji="0" lang="en-US" sz="4200" b="0" i="0" u="none" strike="noStrike" kern="1200" cap="none" spc="0" normalizeH="0" baseline="0" noProof="0" dirty="0">
+                <a:ln>
+                  <a:noFill/>
+                </a:ln>
+                <a:solidFill>
+                  <a:srgbClr val="000000"/>
+                </a:solidFill>
+                <a:effectLst/>
+                <a:uLnTx/>
+                <a:uFillTx/>
+                <a:latin typeface="Arial" charset="0"/>
+                <a:ea typeface="ＭＳ Ｐゴシック" charset="-128"/>
+              </a:rPr>
+              <a:t>View leaderboards and access submitted algorithm solutions for each category</a:t>
+            </a:r>
+          </a:p>
+          <a:p>
+            <a:pPr marL="685800" indent="-685800" algn="l">
               <a:buFont typeface="Arial" panose="020B0604020202020204" pitchFamily="34" charset="0"/>
               <a:buChar char="•"/>
             </a:pPr>
-            <a:r>
-              <a:rPr lang="en-US" sz="4500" dirty="0"/>
-              <a:t>Determining inverter ‘clipping’ intervals</a:t>
-            </a:r>
-          </a:p>
-          <a:p>
-            <a:pPr marL="685800" indent="-685800" algn="just">
-              <a:buFont typeface="Arial" panose="020B0604020202020204" pitchFamily="34" charset="0"/>
-              <a:buChar char="•"/>
-            </a:pPr>
-            <a:r>
-              <a:rPr lang="en-US" sz="4500" dirty="0"/>
-              <a:t>Determining capacity shifts/changes</a:t>
-            </a:r>
-          </a:p>
-          <a:p>
-            <a:pPr marL="685800" indent="-685800" algn="just">
-              <a:buFont typeface="Arial" panose="020B0604020202020204" pitchFamily="34" charset="0"/>
-              <a:buChar char="•"/>
-            </a:pPr>
-            <a:r>
-              <a:rPr lang="en-US" sz="4500" dirty="0"/>
-              <a:t>Estimating system degradation</a:t>
-            </a:r>
-          </a:p>
-          <a:p>
-            <a:pPr marL="685800" indent="-685800" algn="just">
-              <a:buFont typeface="Arial" panose="020B0604020202020204" pitchFamily="34" charset="0"/>
-              <a:buChar char="•"/>
-            </a:pPr>
-            <a:r>
-              <a:rPr lang="en-US" sz="4500" dirty="0"/>
-              <a:t>Estimating soiling </a:t>
-            </a:r>
-          </a:p>
-          <a:p>
-            <a:pPr marL="685800" indent="-685800" algn="just">
-              <a:buFont typeface="Arial" panose="020B0604020202020204" pitchFamily="34" charset="0"/>
-              <a:buChar char="•"/>
-            </a:pPr>
-            <a:r>
-              <a:rPr lang="en-US" sz="4500" dirty="0"/>
-              <a:t>Determining system orientation (fixed, tracking)</a:t>
-            </a:r>
-          </a:p>
-          <a:p>
-            <a:pPr marL="685800" indent="-685800" algn="just">
-              <a:buFont typeface="Arial" panose="020B0604020202020204" pitchFamily="34" charset="0"/>
-              <a:buChar char="•"/>
-            </a:pPr>
-            <a:r>
-              <a:rPr lang="en-US" sz="4500" dirty="0"/>
-              <a:t>And more!</a:t>
-            </a:r>
-          </a:p>
-          <a:p>
-            <a:pPr marL="685800" indent="-685800" algn="just">
-              <a:buFont typeface="Arial" panose="020B0604020202020204" pitchFamily="34" charset="0"/>
-              <a:buChar char="•"/>
-            </a:pPr>
-            <a:endParaRPr lang="en-US" sz="4500" dirty="0"/>
-          </a:p>
-          <a:p>
-            <a:pPr marL="685800" indent="-685800" algn="just">
-              <a:buFont typeface="Arial" panose="020B0604020202020204" pitchFamily="34" charset="0"/>
-              <a:buChar char="•"/>
-            </a:pPr>
-            <a:r>
-              <a:rPr lang="en-US" sz="4500" dirty="0"/>
-              <a:t>White paper topic (Google Drive)</a:t>
-            </a:r>
-          </a:p>
-          <a:p>
-            <a:pPr marL="685800" indent="-685800" algn="just">
-              <a:buFont typeface="Arial" panose="020B0604020202020204" pitchFamily="34" charset="0"/>
-              <a:buChar char="•"/>
-            </a:pPr>
-            <a:endParaRPr lang="en-US" sz="4500" dirty="0"/>
-          </a:p>
-          <a:p>
-            <a:pPr algn="just"/>
-            <a:r>
-              <a:rPr lang="en-US" sz="4500" dirty="0"/>
-              <a:t>Robust Ground Truth Data Sets</a:t>
-            </a:r>
-          </a:p>
-          <a:p>
-            <a:pPr marL="685800" indent="-685800" algn="just">
-              <a:buFont typeface="Arial" panose="020B0604020202020204" pitchFamily="34" charset="0"/>
-              <a:buChar char="•"/>
-            </a:pPr>
-            <a:r>
-              <a:rPr lang="en-US" sz="4500" dirty="0"/>
-              <a:t>Labeled measured data</a:t>
-            </a:r>
-          </a:p>
-          <a:p>
-            <a:pPr marL="685800" indent="-685800" algn="just">
-              <a:buFont typeface="Arial" panose="020B0604020202020204" pitchFamily="34" charset="0"/>
-              <a:buChar char="•"/>
-            </a:pPr>
-            <a:r>
-              <a:rPr lang="en-US" sz="4500" dirty="0"/>
-              <a:t>Synthetic data sets with typical field data issues (capacity issues, outages, soiling, shading, etc.) </a:t>
-            </a:r>
-          </a:p>
-          <a:p>
-            <a:pPr marL="685800" indent="-685800" algn="just">
-              <a:buFont typeface="Arial" panose="020B0604020202020204" pitchFamily="34" charset="0"/>
-              <a:buChar char="•"/>
-            </a:pPr>
-            <a:r>
-              <a:rPr lang="en-US" sz="4500" dirty="0"/>
-              <a:t>Provides a consistent way to quantify performance</a:t>
-            </a:r>
-          </a:p>
-          <a:p>
-            <a:pPr marL="685800" indent="-685800" algn="just">
-              <a:buFont typeface="Arial" panose="020B0604020202020204" pitchFamily="34" charset="0"/>
-              <a:buChar char="•"/>
-            </a:pPr>
-            <a:r>
-              <a:rPr lang="en-US" sz="4500" dirty="0"/>
-              <a:t>Allows us to compare algorithm performance side-by-side</a:t>
-            </a:r>
-          </a:p>
-          <a:p>
-            <a:pPr marL="685800" indent="-685800" algn="just">
-              <a:buFont typeface="Arial" panose="020B0604020202020204" pitchFamily="34" charset="0"/>
-              <a:buChar char="•"/>
-            </a:pPr>
-            <a:endParaRPr lang="en-US" sz="4500" dirty="0"/>
+            <a:endParaRPr lang="en-US" sz="4200" b="0" i="0" dirty="0"/>
           </a:p>
         </p:txBody>
       </p:sp>
       <p:sp>
         <p:nvSpPr>
-          <p:cNvPr id="12" name="TextBox 11">
+          <p:cNvPr id="24" name="TextBox 23">
             <a:extLst>
               <a:ext uri="{FF2B5EF4-FFF2-40B4-BE49-F238E27FC236}">
-                <a16:creationId xmlns:a16="http://schemas.microsoft.com/office/drawing/2014/main" id="{487EF7F9-512A-DDAA-2A0F-E3717E9B69F6}"/>
+                <a16:creationId xmlns:a16="http://schemas.microsoft.com/office/drawing/2014/main" id="{A19E3F6A-3CF1-3456-F4FA-4262FDEFB717}"/>
               </a:ext>
             </a:extLst>
           </p:cNvPr>
@@ -4601,8 +7677,67 @@
         </p:nvSpPr>
         <p:spPr>
           <a:xfrm>
-            <a:off x="4190999" y="11991916"/>
-            <a:ext cx="12563173" cy="10095071"/>
+            <a:off x="914400" y="12340283"/>
+            <a:ext cx="17211333" cy="5262979"/>
+          </a:xfrm>
+          <a:prstGeom prst="rect">
+            <a:avLst/>
+          </a:prstGeom>
+          <a:noFill/>
+        </p:spPr>
+        <p:txBody>
+          <a:bodyPr wrap="square">
+            <a:spAutoFit/>
+          </a:bodyPr>
+          <a:lstStyle/>
+          <a:p>
+            <a:pPr marL="685800" indent="-685800" algn="l">
+              <a:buFont typeface="Arial" panose="020B0604020202020204" pitchFamily="34" charset="0"/>
+              <a:buChar char="•"/>
+            </a:pPr>
+            <a:r>
+              <a:rPr lang="en-US" sz="4200" b="0" i="0" dirty="0"/>
+              <a:t>The PV Validation Hub website will allow developers in the PV community to submit executable code to benchmark against hosted sets for various problems. </a:t>
+            </a:r>
+          </a:p>
+          <a:p>
+            <a:pPr marL="685800" indent="-685800" algn="l">
+              <a:buFont typeface="Arial" panose="020B0604020202020204" pitchFamily="34" charset="0"/>
+              <a:buChar char="•"/>
+            </a:pPr>
+            <a:r>
+              <a:rPr lang="en-US" sz="4200" b="0" i="0" dirty="0"/>
+              <a:t>One-stop shop for benchmarking and comparing algorithm performance for a variety of PV-related problems (degradation, soiling, etc.)</a:t>
+            </a:r>
+          </a:p>
+          <a:p>
+            <a:pPr marL="685800" indent="-685800" algn="l">
+              <a:buFont typeface="Arial" panose="020B0604020202020204" pitchFamily="34" charset="0"/>
+              <a:buChar char="•"/>
+            </a:pPr>
+            <a:r>
+              <a:rPr lang="en-US" sz="4200" b="0" i="0" dirty="0"/>
+              <a:t>Consistent labeled data sets allow for side-by-side comparison of different algorithms</a:t>
+            </a:r>
+          </a:p>
+        </p:txBody>
+      </p:sp>
+      <p:sp>
+        <p:nvSpPr>
+          <p:cNvPr id="2" name="TextBox 1">
+            <a:extLst>
+              <a:ext uri="{FF2B5EF4-FFF2-40B4-BE49-F238E27FC236}">
+                <a16:creationId xmlns:a16="http://schemas.microsoft.com/office/drawing/2014/main" id="{638859D7-D724-168A-CC95-5364940F245E}"/>
+              </a:ext>
+            </a:extLst>
+          </p:cNvPr>
+          <p:cNvSpPr txBox="1"/>
+          <p:nvPr/>
+        </p:nvSpPr>
+        <p:spPr>
+          <a:xfrm>
+            <a:off x="28487136" y="38437218"/>
+            <a:ext cx="8428456" cy="2862322"/>
           </a:xfrm>
           <a:prstGeom prst="rect">
             <a:avLst/>
@@ -4615,59 +7750,191 @@
           </a:bodyPr>
           <a:lstStyle/>
           <a:p>
+            <a:r>
+              <a:rPr lang="en-US" sz="4500" dirty="0"/>
+              <a:t>Take our feedback survey:</a:t>
+            </a:r>
+          </a:p>
+          <a:p>
+            <a:endParaRPr lang="en-US" sz="4500" dirty="0"/>
+          </a:p>
+          <a:p>
+            <a:r>
+              <a:rPr lang="en-US" sz="4500" dirty="0">
+                <a:solidFill>
+                  <a:srgbClr val="FF0000"/>
+                </a:solidFill>
+              </a:rPr>
+              <a:t>ADD QR CODE HERE LINKING TO SURVEY</a:t>
+            </a:r>
+          </a:p>
+        </p:txBody>
+      </p:sp>
+      <p:graphicFrame>
+        <p:nvGraphicFramePr>
+          <p:cNvPr id="10" name="Diagram 9">
+            <a:extLst>
+              <a:ext uri="{FF2B5EF4-FFF2-40B4-BE49-F238E27FC236}">
+                <a16:creationId xmlns:a16="http://schemas.microsoft.com/office/drawing/2014/main" id="{7C5CEA2C-DBA7-E60E-978F-97489CFE9ED1}"/>
+              </a:ext>
+            </a:extLst>
+          </p:cNvPr>
+          <p:cNvGraphicFramePr/>
+          <p:nvPr>
+            <p:extLst>
+              <p:ext uri="{D42A27DB-BD31-4B8C-83A1-F6EECF244321}">
+                <p14:modId xmlns:p14="http://schemas.microsoft.com/office/powerpoint/2010/main" val="2193547417"/>
+              </p:ext>
+            </p:extLst>
+          </p:nvPr>
+        </p:nvGraphicFramePr>
+        <p:xfrm>
+          <a:off x="1687355" y="27658868"/>
+          <a:ext cx="14877334" cy="4733509"/>
+        </p:xfrm>
+        <a:graphic>
+          <a:graphicData uri="http://schemas.openxmlformats.org/drawingml/2006/diagram">
+            <dgm:relIds xmlns:dgm="http://schemas.openxmlformats.org/drawingml/2006/diagram" xmlns:r="http://schemas.openxmlformats.org/officeDocument/2006/relationships" r:dm="rId9" r:lo="rId10" r:qs="rId11" r:cs="rId12"/>
+          </a:graphicData>
+        </a:graphic>
+      </p:graphicFrame>
+      <p:pic>
+        <p:nvPicPr>
+          <p:cNvPr id="7" name="Picture 6">
+            <a:extLst>
+              <a:ext uri="{FF2B5EF4-FFF2-40B4-BE49-F238E27FC236}">
+                <a16:creationId xmlns:a16="http://schemas.microsoft.com/office/drawing/2014/main" id="{8C83B5AC-EA3D-1D8E-C7DA-DFF7EB16C3CA}"/>
+              </a:ext>
+            </a:extLst>
+          </p:cNvPr>
+          <p:cNvPicPr>
+            <a:picLocks noChangeAspect="1"/>
+          </p:cNvPicPr>
+          <p:nvPr/>
+        </p:nvPicPr>
+        <p:blipFill>
+          <a:blip r:embed="rId14"/>
+          <a:stretch>
+            <a:fillRect/>
+          </a:stretch>
+        </p:blipFill>
+        <p:spPr>
+          <a:xfrm>
+            <a:off x="8190532" y="34785012"/>
+            <a:ext cx="9906215" cy="5305893"/>
+          </a:xfrm>
+          <a:prstGeom prst="rect">
+            <a:avLst/>
+          </a:prstGeom>
+        </p:spPr>
+      </p:pic>
+      <p:sp>
+        <p:nvSpPr>
+          <p:cNvPr id="23" name="TextBox 22">
+            <a:extLst>
+              <a:ext uri="{FF2B5EF4-FFF2-40B4-BE49-F238E27FC236}">
+                <a16:creationId xmlns:a16="http://schemas.microsoft.com/office/drawing/2014/main" id="{41E0E414-ED79-909C-DDAF-E0E65BEF6A3E}"/>
+              </a:ext>
+            </a:extLst>
+          </p:cNvPr>
+          <p:cNvSpPr txBox="1"/>
+          <p:nvPr/>
+        </p:nvSpPr>
+        <p:spPr>
+          <a:xfrm>
+            <a:off x="9627151" y="40399827"/>
+            <a:ext cx="7228259" cy="1323439"/>
+          </a:xfrm>
+          <a:prstGeom prst="rect">
+            <a:avLst/>
+          </a:prstGeom>
+          <a:noFill/>
+        </p:spPr>
+        <p:txBody>
+          <a:bodyPr wrap="square" rtlCol="0">
+            <a:spAutoFit/>
+          </a:bodyPr>
+          <a:lstStyle/>
+          <a:p>
             <a:pPr algn="l"/>
             <a:r>
-              <a:rPr lang="en-US" sz="5000" dirty="0"/>
-              <a:t>Developer and User Roles</a:t>
-            </a:r>
-          </a:p>
-          <a:p>
-            <a:pPr algn="l"/>
-            <a:r>
-              <a:rPr lang="en-US" sz="5000" dirty="0"/>
-              <a:t>Talk about what they can get from it</a:t>
-            </a:r>
-          </a:p>
-          <a:p>
-            <a:pPr algn="l"/>
-            <a:endParaRPr lang="en-US" sz="5000" dirty="0"/>
-          </a:p>
-          <a:p>
-            <a:pPr algn="l"/>
-            <a:r>
-              <a:rPr lang="en-US" sz="5000" dirty="0"/>
-              <a:t>Private reports with lots of info + public reports (maybe include Duncan’s graphic for private reports)</a:t>
-            </a:r>
-          </a:p>
-          <a:p>
-            <a:pPr algn="l"/>
-            <a:endParaRPr lang="en-US" sz="5000" dirty="0"/>
-          </a:p>
-          <a:p>
-            <a:pPr algn="l"/>
-            <a:r>
-              <a:rPr lang="en-US" sz="5000" dirty="0"/>
-              <a:t>QR code to survey</a:t>
-            </a:r>
-          </a:p>
-          <a:p>
-            <a:pPr algn="l"/>
-            <a:endParaRPr lang="en-US" sz="5000" dirty="0"/>
-          </a:p>
-          <a:p>
-            <a:pPr algn="l"/>
-            <a:r>
-              <a:rPr lang="en-US" sz="5000" dirty="0"/>
-              <a:t>White paper (framing-go to Google Drive)</a:t>
-            </a:r>
-          </a:p>
-          <a:p>
-            <a:pPr algn="l"/>
-            <a:endParaRPr lang="en-US" sz="5000" dirty="0"/>
-          </a:p>
-          <a:p>
-            <a:pPr algn="l"/>
-            <a:endParaRPr lang="en-US" sz="5000" dirty="0"/>
+              <a:rPr lang="en-US" sz="4000" dirty="0"/>
+              <a:t>Example private report sent to the developer </a:t>
+            </a:r>
+          </a:p>
+        </p:txBody>
+      </p:sp>
+      <p:sp>
+        <p:nvSpPr>
+          <p:cNvPr id="27" name="TextBox 26">
+            <a:extLst>
+              <a:ext uri="{FF2B5EF4-FFF2-40B4-BE49-F238E27FC236}">
+                <a16:creationId xmlns:a16="http://schemas.microsoft.com/office/drawing/2014/main" id="{CB2D52D3-0BF4-728D-F08A-EFCE894EF30A}"/>
+              </a:ext>
+            </a:extLst>
+          </p:cNvPr>
+          <p:cNvSpPr txBox="1"/>
+          <p:nvPr/>
+        </p:nvSpPr>
+        <p:spPr>
+          <a:xfrm>
+            <a:off x="1611156" y="35660379"/>
+            <a:ext cx="4410575" cy="3170099"/>
+          </a:xfrm>
+          <a:prstGeom prst="rect">
+            <a:avLst/>
+          </a:prstGeom>
+          <a:noFill/>
+        </p:spPr>
+        <p:txBody>
+          <a:bodyPr wrap="square" rtlCol="0">
+            <a:spAutoFit/>
+          </a:bodyPr>
+          <a:lstStyle/>
+          <a:p>
+            <a:r>
+              <a:rPr lang="en-US" sz="4000" dirty="0">
+                <a:solidFill>
+                  <a:srgbClr val="FF0000"/>
+                </a:solidFill>
+              </a:rPr>
+              <a:t>ADD SCREENSHOT OF PUBLIC DASHBOARD HERE</a:t>
+            </a:r>
+          </a:p>
+        </p:txBody>
+      </p:sp>
+      <p:sp>
+        <p:nvSpPr>
+          <p:cNvPr id="28" name="TextBox 27">
+            <a:extLst>
+              <a:ext uri="{FF2B5EF4-FFF2-40B4-BE49-F238E27FC236}">
+                <a16:creationId xmlns:a16="http://schemas.microsoft.com/office/drawing/2014/main" id="{77227271-263D-19EF-9A5F-06CBD01AF6C0}"/>
+              </a:ext>
+            </a:extLst>
+          </p:cNvPr>
+          <p:cNvSpPr txBox="1"/>
+          <p:nvPr/>
+        </p:nvSpPr>
+        <p:spPr>
+          <a:xfrm>
+            <a:off x="1295400" y="31526595"/>
+            <a:ext cx="11367139" cy="707886"/>
+          </a:xfrm>
+          <a:prstGeom prst="rect">
+            <a:avLst/>
+          </a:prstGeom>
+          <a:noFill/>
+        </p:spPr>
+        <p:txBody>
+          <a:bodyPr wrap="square" rtlCol="0">
+            <a:spAutoFit/>
+          </a:bodyPr>
+          <a:lstStyle/>
+          <a:p>
+            <a:r>
+              <a:rPr lang="en-US" sz="4000" dirty="0"/>
+              <a:t>Validation Hub algorithm submission process</a:t>
+            </a:r>
           </a:p>
         </p:txBody>
       </p:sp>
@@ -4676,6 +7943,11 @@
   <p:clrMapOvr>
     <a:masterClrMapping/>
   </p:clrMapOvr>
+  <p:extLst>
+    <p:ext uri="{6950BFC3-D8DA-4A85-94F7-54DA5524770B}">
+      <p188:commentRel xmlns:p188="http://schemas.microsoft.com/office/powerpoint/2018/8/main" r:id="rId3"/>
+    </p:ext>
+  </p:extLst>
 </p:sld>
 </file>
 

</xml_diff>